<commit_message>
added more explanatory slides
</commit_message>
<xml_diff>
--- a/WMD_pycon_slides_2016.pptx
+++ b/WMD_pycon_slides_2016.pptx
@@ -5,7 +5,7 @@
     <p:sldMasterId id="2147483659" r:id="rId1"/>
   </p:sldMasterIdLst>
   <p:notesMasterIdLst>
-    <p:notesMasterId r:id="rId17"/>
+    <p:notesMasterId r:id="rId18"/>
   </p:notesMasterIdLst>
   <p:sldIdLst>
     <p:sldId id="256" r:id="rId2"/>
@@ -13,16 +13,17 @@
     <p:sldId id="260" r:id="rId4"/>
     <p:sldId id="261" r:id="rId5"/>
     <p:sldId id="262" r:id="rId6"/>
-    <p:sldId id="263" r:id="rId7"/>
-    <p:sldId id="264" r:id="rId8"/>
-    <p:sldId id="273" r:id="rId9"/>
-    <p:sldId id="266" r:id="rId10"/>
-    <p:sldId id="267" r:id="rId11"/>
-    <p:sldId id="268" r:id="rId12"/>
-    <p:sldId id="269" r:id="rId13"/>
-    <p:sldId id="270" r:id="rId14"/>
-    <p:sldId id="271" r:id="rId15"/>
-    <p:sldId id="272" r:id="rId16"/>
+    <p:sldId id="270" r:id="rId7"/>
+    <p:sldId id="271" r:id="rId8"/>
+    <p:sldId id="263" r:id="rId9"/>
+    <p:sldId id="264" r:id="rId10"/>
+    <p:sldId id="274" r:id="rId11"/>
+    <p:sldId id="273" r:id="rId12"/>
+    <p:sldId id="266" r:id="rId13"/>
+    <p:sldId id="267" r:id="rId14"/>
+    <p:sldId id="268" r:id="rId15"/>
+    <p:sldId id="269" r:id="rId16"/>
+    <p:sldId id="272" r:id="rId17"/>
   </p:sldIdLst>
   <p:sldSz cx="9144000" cy="5143500" type="screen16x9"/>
   <p:notesSz cx="6858000" cy="9144000"/>
@@ -763,11 +764,11 @@
 </file>
 
 <file path=ppt/notesSlides/notesSlide10.xml><?xml version="1.0" encoding="utf-8"?>
-<p:notes xmlns:a="http://schemas.openxmlformats.org/drawingml/2006/main" xmlns:r="http://schemas.openxmlformats.org/officeDocument/2006/relationships" xmlns:p="http://schemas.openxmlformats.org/presentationml/2006/main" showMasterSp="0" showMasterPhAnim="0">
+<p:notes xmlns:a="http://schemas.openxmlformats.org/drawingml/2006/main" xmlns:r="http://schemas.openxmlformats.org/officeDocument/2006/relationships" xmlns:p="http://schemas.openxmlformats.org/presentationml/2006/main">
   <p:cSld>
     <p:spTree>
       <p:nvGrpSpPr>
-        <p:cNvPr id="1" name="Shape 131"/>
+        <p:cNvPr id="1" name=""/>
         <p:cNvGrpSpPr/>
         <p:nvPr/>
       </p:nvGrpSpPr>
@@ -781,7 +782,142 @@
       </p:grpSpPr>
       <p:sp>
         <p:nvSpPr>
-          <p:cNvPr id="132" name="Shape 132"/>
+          <p:cNvPr id="2" name="Slide Image Placeholder 1"/>
+          <p:cNvSpPr>
+            <a:spLocks noGrp="1" noRot="1" noChangeAspect="1"/>
+          </p:cNvSpPr>
+          <p:nvPr>
+            <p:ph type="sldImg"/>
+          </p:nvPr>
+        </p:nvSpPr>
+        <p:spPr>
+          <a:xfrm>
+            <a:off x="381000" y="685800"/>
+            <a:ext cx="6096000" cy="3429000"/>
+          </a:xfrm>
+        </p:spPr>
+      </p:sp>
+      <p:sp>
+        <p:nvSpPr>
+          <p:cNvPr id="3" name="Notes Placeholder 2"/>
+          <p:cNvSpPr>
+            <a:spLocks noGrp="1"/>
+          </p:cNvSpPr>
+          <p:nvPr>
+            <p:ph type="body" idx="1"/>
+          </p:nvPr>
+        </p:nvSpPr>
+        <p:spPr/>
+        <p:txBody>
+          <a:bodyPr/>
+          <a:lstStyle/>
+          <a:p>
+            <a:endParaRPr lang="en-IN" dirty="0"/>
+          </a:p>
+        </p:txBody>
+      </p:sp>
+    </p:spTree>
+    <p:extLst>
+      <p:ext uri="{BB962C8B-B14F-4D97-AF65-F5344CB8AC3E}">
+        <p14:creationId xmlns:p14="http://schemas.microsoft.com/office/powerpoint/2010/main" val="772997296"/>
+      </p:ext>
+    </p:extLst>
+  </p:cSld>
+  <p:clrMapOvr>
+    <a:masterClrMapping/>
+  </p:clrMapOvr>
+</p:notes>
+</file>
+
+<file path=ppt/notesSlides/notesSlide11.xml><?xml version="1.0" encoding="utf-8"?>
+<p:notes xmlns:a="http://schemas.openxmlformats.org/drawingml/2006/main" xmlns:r="http://schemas.openxmlformats.org/officeDocument/2006/relationships" xmlns:p="http://schemas.openxmlformats.org/presentationml/2006/main">
+  <p:cSld>
+    <p:spTree>
+      <p:nvGrpSpPr>
+        <p:cNvPr id="1" name=""/>
+        <p:cNvGrpSpPr/>
+        <p:nvPr/>
+      </p:nvGrpSpPr>
+      <p:grpSpPr>
+        <a:xfrm>
+          <a:off x="0" y="0"/>
+          <a:ext cx="0" cy="0"/>
+          <a:chOff x="0" y="0"/>
+          <a:chExt cx="0" cy="0"/>
+        </a:xfrm>
+      </p:grpSpPr>
+      <p:sp>
+        <p:nvSpPr>
+          <p:cNvPr id="2" name="Slide Image Placeholder 1"/>
+          <p:cNvSpPr>
+            <a:spLocks noGrp="1" noRot="1" noChangeAspect="1"/>
+          </p:cNvSpPr>
+          <p:nvPr>
+            <p:ph type="sldImg"/>
+          </p:nvPr>
+        </p:nvSpPr>
+        <p:spPr/>
+      </p:sp>
+      <p:sp>
+        <p:nvSpPr>
+          <p:cNvPr id="3" name="Notes Placeholder 2"/>
+          <p:cNvSpPr>
+            <a:spLocks noGrp="1"/>
+          </p:cNvSpPr>
+          <p:nvPr>
+            <p:ph type="body" idx="1"/>
+          </p:nvPr>
+        </p:nvSpPr>
+        <p:spPr/>
+        <p:txBody>
+          <a:bodyPr/>
+          <a:lstStyle/>
+          <a:p>
+            <a:r>
+              <a:rPr lang="en-IN" dirty="0" smtClean="0"/>
+              <a:t>This</a:t>
+            </a:r>
+            <a:r>
+              <a:rPr lang="en-IN" baseline="0" dirty="0" smtClean="0"/>
+              <a:t> is a plot of WMD(blue), WCD(Black), RWMD(red) distances of a query sentence with all the documents, arranged in ascending order. These lower bounds can be used to make reduce the computations of WMD. For more details you can refer to the paper.</a:t>
+            </a:r>
+            <a:endParaRPr lang="en-IN" dirty="0"/>
+          </a:p>
+        </p:txBody>
+      </p:sp>
+    </p:spTree>
+    <p:extLst>
+      <p:ext uri="{BB962C8B-B14F-4D97-AF65-F5344CB8AC3E}">
+        <p14:creationId xmlns:p14="http://schemas.microsoft.com/office/powerpoint/2010/main" val="3309724259"/>
+      </p:ext>
+    </p:extLst>
+  </p:cSld>
+  <p:clrMapOvr>
+    <a:masterClrMapping/>
+  </p:clrMapOvr>
+</p:notes>
+</file>
+
+<file path=ppt/notesSlides/notesSlide12.xml><?xml version="1.0" encoding="utf-8"?>
+<p:notes xmlns:a="http://schemas.openxmlformats.org/drawingml/2006/main" xmlns:r="http://schemas.openxmlformats.org/officeDocument/2006/relationships" xmlns:p="http://schemas.openxmlformats.org/presentationml/2006/main" showMasterSp="0" showMasterPhAnim="0">
+  <p:cSld>
+    <p:spTree>
+      <p:nvGrpSpPr>
+        <p:cNvPr id="1" name="Shape 123"/>
+        <p:cNvGrpSpPr/>
+        <p:nvPr/>
+      </p:nvGrpSpPr>
+      <p:grpSpPr>
+        <a:xfrm>
+          <a:off x="0" y="0"/>
+          <a:ext cx="0" cy="0"/>
+          <a:chOff x="0" y="0"/>
+          <a:chExt cx="0" cy="0"/>
+        </a:xfrm>
+      </p:grpSpPr>
+      <p:sp>
+        <p:nvSpPr>
+          <p:cNvPr id="124" name="Shape 124"/>
           <p:cNvSpPr>
             <a:spLocks noGrp="1" noRot="1" noChangeAspect="1"/>
           </p:cNvSpPr>
@@ -822,7 +958,7 @@
       </p:sp>
       <p:sp>
         <p:nvSpPr>
-          <p:cNvPr id="133" name="Shape 133"/>
+          <p:cNvPr id="125" name="Shape 125"/>
           <p:cNvSpPr txBox="1">
             <a:spLocks noGrp="1"/>
           </p:cNvSpPr>
@@ -853,23 +989,61 @@
             </a:pPr>
             <a:r>
               <a:rPr lang="en" dirty="0"/>
-              <a:t>Thank you for listening</a:t>
-            </a:r>
-            <a:r>
-              <a:rPr lang="en" dirty="0" smtClean="0"/>
-              <a:t>. You can contact me on gitter or in</a:t>
-            </a:r>
-            <a:r>
-              <a:rPr lang="en" baseline="0" dirty="0" smtClean="0"/>
-              <a:t> the evening,</a:t>
-            </a:r>
-            <a:r>
-              <a:rPr lang="en" dirty="0" smtClean="0"/>
-              <a:t> </a:t>
-            </a:r>
+              <a:t>Here is the gensim API for finding similar reviews. We trained it on Yelp reviews of a popular Las Vegas joint that doesn’t  have ice cream unfortunately but has a great view.</a:t>
+            </a:r>
+          </a:p>
+          <a:p>
+            <a:pPr lvl="0" rtl="0">
+              <a:spcBef>
+                <a:spcPts val="0"/>
+              </a:spcBef>
+              <a:buNone/>
+            </a:pPr>
+            <a:endParaRPr dirty="0"/>
+          </a:p>
+          <a:p>
+            <a:pPr lvl="0" rtl="0">
+              <a:spcBef>
+                <a:spcPts val="0"/>
+              </a:spcBef>
+              <a:buNone/>
+            </a:pPr>
             <a:r>
               <a:rPr lang="en" dirty="0"/>
-              <a:t>if you would like to know more or have an idea for a pull request.</a:t>
+              <a:t>The question is “What reviews are most similar to “Very good, you should seat outdoor’?”</a:t>
+            </a:r>
+          </a:p>
+          <a:p>
+            <a:pPr lvl="0" rtl="0">
+              <a:spcBef>
+                <a:spcPts val="0"/>
+              </a:spcBef>
+              <a:buNone/>
+            </a:pPr>
+            <a:r>
+              <a:rPr lang="en" dirty="0"/>
+              <a:t>You can see the answers here together with their similarity scores(higher values mean more similar). </a:t>
+            </a:r>
+          </a:p>
+          <a:p>
+            <a:pPr lvl="0" rtl="0">
+              <a:spcBef>
+                <a:spcPts val="0"/>
+              </a:spcBef>
+              <a:buNone/>
+            </a:pPr>
+            <a:endParaRPr dirty="0"/>
+          </a:p>
+          <a:p>
+            <a:pPr lvl="0">
+              <a:spcBef>
+                <a:spcPts val="0"/>
+              </a:spcBef>
+              <a:buNone/>
+            </a:pPr>
+            <a:r>
+              <a:rPr lang="en" dirty="0"/>
+              <a:t>The first match doesn’t contain a single word in common with our query!</a:t>
             </a:r>
           </a:p>
         </p:txBody>
@@ -877,7 +1051,7 @@
     </p:spTree>
     <p:extLst>
       <p:ext uri="{BB962C8B-B14F-4D97-AF65-F5344CB8AC3E}">
-        <p14:creationId xmlns:p14="http://schemas.microsoft.com/office/powerpoint/2010/main" val="1329001499"/>
+        <p14:creationId xmlns:p14="http://schemas.microsoft.com/office/powerpoint/2010/main" val="894464740"/>
       </p:ext>
     </p:extLst>
   </p:cSld>
@@ -887,12 +1061,12 @@
 </p:notes>
 </file>
 
-<file path=ppt/notesSlides/notesSlide11.xml><?xml version="1.0" encoding="utf-8"?>
+<file path=ppt/notesSlides/notesSlide13.xml><?xml version="1.0" encoding="utf-8"?>
 <p:notes xmlns:a="http://schemas.openxmlformats.org/drawingml/2006/main" xmlns:r="http://schemas.openxmlformats.org/officeDocument/2006/relationships" xmlns:p="http://schemas.openxmlformats.org/presentationml/2006/main" showMasterSp="0" showMasterPhAnim="0">
   <p:cSld>
     <p:spTree>
       <p:nvGrpSpPr>
-        <p:cNvPr id="1" name="Shape 139"/>
+        <p:cNvPr id="1" name="Shape 131"/>
         <p:cNvGrpSpPr/>
         <p:nvPr/>
       </p:nvGrpSpPr>
@@ -906,7 +1080,7 @@
       </p:grpSpPr>
       <p:sp>
         <p:nvSpPr>
-          <p:cNvPr id="140" name="Shape 140"/>
+          <p:cNvPr id="132" name="Shape 132"/>
           <p:cNvSpPr>
             <a:spLocks noGrp="1" noRot="1" noChangeAspect="1"/>
           </p:cNvSpPr>
@@ -947,7 +1121,7 @@
       </p:sp>
       <p:sp>
         <p:nvSpPr>
-          <p:cNvPr id="141" name="Shape 141"/>
+          <p:cNvPr id="133" name="Shape 133"/>
           <p:cNvSpPr txBox="1">
             <a:spLocks noGrp="1"/>
           </p:cNvSpPr>
@@ -976,14 +1150,33 @@
               </a:spcBef>
               <a:buNone/>
             </a:pPr>
-            <a:endParaRPr/>
+            <a:r>
+              <a:rPr lang="en" dirty="0"/>
+              <a:t>Thank you for listening</a:t>
+            </a:r>
+            <a:r>
+              <a:rPr lang="en" dirty="0" smtClean="0"/>
+              <a:t>. You can contact me on gitter or in</a:t>
+            </a:r>
+            <a:r>
+              <a:rPr lang="en" baseline="0" dirty="0" smtClean="0"/>
+              <a:t> the evening,</a:t>
+            </a:r>
+            <a:r>
+              <a:rPr lang="en" dirty="0" smtClean="0"/>
+              <a:t> </a:t>
+            </a:r>
+            <a:r>
+              <a:rPr lang="en" dirty="0"/>
+              <a:t>if you would like to know more or have an idea for a pull request.</a:t>
+            </a:r>
           </a:p>
         </p:txBody>
       </p:sp>
     </p:spTree>
     <p:extLst>
       <p:ext uri="{BB962C8B-B14F-4D97-AF65-F5344CB8AC3E}">
-        <p14:creationId xmlns:p14="http://schemas.microsoft.com/office/powerpoint/2010/main" val="121483384"/>
+        <p14:creationId xmlns:p14="http://schemas.microsoft.com/office/powerpoint/2010/main" val="1329001499"/>
       </p:ext>
     </p:extLst>
   </p:cSld>
@@ -993,12 +1186,12 @@
 </p:notes>
 </file>
 
-<file path=ppt/notesSlides/notesSlide12.xml><?xml version="1.0" encoding="utf-8"?>
+<file path=ppt/notesSlides/notesSlide14.xml><?xml version="1.0" encoding="utf-8"?>
 <p:notes xmlns:a="http://schemas.openxmlformats.org/drawingml/2006/main" xmlns:r="http://schemas.openxmlformats.org/officeDocument/2006/relationships" xmlns:p="http://schemas.openxmlformats.org/presentationml/2006/main" showMasterSp="0" showMasterPhAnim="0">
   <p:cSld>
     <p:spTree>
       <p:nvGrpSpPr>
-        <p:cNvPr id="1" name="Shape 145"/>
+        <p:cNvPr id="1" name="Shape 139"/>
         <p:cNvGrpSpPr/>
         <p:nvPr/>
       </p:nvGrpSpPr>
@@ -1012,7 +1205,7 @@
       </p:grpSpPr>
       <p:sp>
         <p:nvSpPr>
-          <p:cNvPr id="146" name="Shape 146"/>
+          <p:cNvPr id="140" name="Shape 140"/>
           <p:cNvSpPr>
             <a:spLocks noGrp="1" noRot="1" noChangeAspect="1"/>
           </p:cNvSpPr>
@@ -1053,7 +1246,7 @@
       </p:sp>
       <p:sp>
         <p:nvSpPr>
-          <p:cNvPr id="147" name="Shape 147"/>
+          <p:cNvPr id="141" name="Shape 141"/>
           <p:cNvSpPr txBox="1">
             <a:spLocks noGrp="1"/>
           </p:cNvSpPr>
@@ -1089,7 +1282,7 @@
     </p:spTree>
     <p:extLst>
       <p:ext uri="{BB962C8B-B14F-4D97-AF65-F5344CB8AC3E}">
-        <p14:creationId xmlns:p14="http://schemas.microsoft.com/office/powerpoint/2010/main" val="56672133"/>
+        <p14:creationId xmlns:p14="http://schemas.microsoft.com/office/powerpoint/2010/main" val="121483384"/>
       </p:ext>
     </p:extLst>
   </p:cSld>
@@ -1099,12 +1292,12 @@
 </p:notes>
 </file>
 
-<file path=ppt/notesSlides/notesSlide13.xml><?xml version="1.0" encoding="utf-8"?>
+<file path=ppt/notesSlides/notesSlide15.xml><?xml version="1.0" encoding="utf-8"?>
 <p:notes xmlns:a="http://schemas.openxmlformats.org/drawingml/2006/main" xmlns:r="http://schemas.openxmlformats.org/officeDocument/2006/relationships" xmlns:p="http://schemas.openxmlformats.org/presentationml/2006/main" showMasterSp="0" showMasterPhAnim="0">
   <p:cSld>
     <p:spTree>
       <p:nvGrpSpPr>
-        <p:cNvPr id="1" name="Shape 151"/>
+        <p:cNvPr id="1" name="Shape 145"/>
         <p:cNvGrpSpPr/>
         <p:nvPr/>
       </p:nvGrpSpPr>
@@ -1118,7 +1311,7 @@
       </p:grpSpPr>
       <p:sp>
         <p:nvSpPr>
-          <p:cNvPr id="152" name="Shape 152"/>
+          <p:cNvPr id="146" name="Shape 146"/>
           <p:cNvSpPr>
             <a:spLocks noGrp="1" noRot="1" noChangeAspect="1"/>
           </p:cNvSpPr>
@@ -1159,7 +1352,7 @@
       </p:sp>
       <p:sp>
         <p:nvSpPr>
-          <p:cNvPr id="153" name="Shape 153"/>
+          <p:cNvPr id="147" name="Shape 147"/>
           <p:cNvSpPr txBox="1">
             <a:spLocks noGrp="1"/>
           </p:cNvSpPr>
@@ -1182,7 +1375,7 @@
           </a:bodyPr>
           <a:lstStyle/>
           <a:p>
-            <a:pPr lvl="0">
+            <a:pPr lvl="0" rtl="0">
               <a:spcBef>
                 <a:spcPts val="0"/>
               </a:spcBef>
@@ -1195,7 +1388,7 @@
     </p:spTree>
     <p:extLst>
       <p:ext uri="{BB962C8B-B14F-4D97-AF65-F5344CB8AC3E}">
-        <p14:creationId xmlns:p14="http://schemas.microsoft.com/office/powerpoint/2010/main" val="1950325884"/>
+        <p14:creationId xmlns:p14="http://schemas.microsoft.com/office/powerpoint/2010/main" val="56672133"/>
       </p:ext>
     </p:extLst>
   </p:cSld>
@@ -1205,113 +1398,7 @@
 </p:notes>
 </file>
 
-<file path=ppt/notesSlides/notesSlide14.xml><?xml version="1.0" encoding="utf-8"?>
-<p:notes xmlns:a="http://schemas.openxmlformats.org/drawingml/2006/main" xmlns:r="http://schemas.openxmlformats.org/officeDocument/2006/relationships" xmlns:p="http://schemas.openxmlformats.org/presentationml/2006/main" showMasterSp="0" showMasterPhAnim="0">
-  <p:cSld>
-    <p:spTree>
-      <p:nvGrpSpPr>
-        <p:cNvPr id="1" name="Shape 159"/>
-        <p:cNvGrpSpPr/>
-        <p:nvPr/>
-      </p:nvGrpSpPr>
-      <p:grpSpPr>
-        <a:xfrm>
-          <a:off x="0" y="0"/>
-          <a:ext cx="0" cy="0"/>
-          <a:chOff x="0" y="0"/>
-          <a:chExt cx="0" cy="0"/>
-        </a:xfrm>
-      </p:grpSpPr>
-      <p:sp>
-        <p:nvSpPr>
-          <p:cNvPr id="160" name="Shape 160"/>
-          <p:cNvSpPr>
-            <a:spLocks noGrp="1" noRot="1" noChangeAspect="1"/>
-          </p:cNvSpPr>
-          <p:nvPr>
-            <p:ph type="sldImg" idx="2"/>
-          </p:nvPr>
-        </p:nvSpPr>
-        <p:spPr>
-          <a:xfrm>
-            <a:off x="381000" y="685800"/>
-            <a:ext cx="6096000" cy="3429000"/>
-          </a:xfrm>
-          <a:custGeom>
-            <a:avLst/>
-            <a:gdLst/>
-            <a:ahLst/>
-            <a:cxnLst/>
-            <a:rect l="0" t="0" r="0" b="0"/>
-            <a:pathLst>
-              <a:path w="120000" h="120000" extrusionOk="0">
-                <a:moveTo>
-                  <a:pt x="0" y="0"/>
-                </a:moveTo>
-                <a:lnTo>
-                  <a:pt x="120000" y="0"/>
-                </a:lnTo>
-                <a:lnTo>
-                  <a:pt x="120000" y="120000"/>
-                </a:lnTo>
-                <a:lnTo>
-                  <a:pt x="0" y="120000"/>
-                </a:lnTo>
-                <a:close/>
-              </a:path>
-            </a:pathLst>
-          </a:custGeom>
-        </p:spPr>
-      </p:sp>
-      <p:sp>
-        <p:nvSpPr>
-          <p:cNvPr id="161" name="Shape 161"/>
-          <p:cNvSpPr txBox="1">
-            <a:spLocks noGrp="1"/>
-          </p:cNvSpPr>
-          <p:nvPr>
-            <p:ph type="body" idx="1"/>
-          </p:nvPr>
-        </p:nvSpPr>
-        <p:spPr>
-          <a:xfrm>
-            <a:off x="685800" y="4343400"/>
-            <a:ext cx="5486400" cy="4114800"/>
-          </a:xfrm>
-          <a:prstGeom prst="rect">
-            <a:avLst/>
-          </a:prstGeom>
-        </p:spPr>
-        <p:txBody>
-          <a:bodyPr lIns="91425" tIns="91425" rIns="91425" bIns="91425" anchor="t" anchorCtr="0">
-            <a:noAutofit/>
-          </a:bodyPr>
-          <a:lstStyle/>
-          <a:p>
-            <a:pPr lvl="0">
-              <a:spcBef>
-                <a:spcPts val="0"/>
-              </a:spcBef>
-              <a:buNone/>
-            </a:pPr>
-            <a:endParaRPr/>
-          </a:p>
-        </p:txBody>
-      </p:sp>
-    </p:spTree>
-    <p:extLst>
-      <p:ext uri="{BB962C8B-B14F-4D97-AF65-F5344CB8AC3E}">
-        <p14:creationId xmlns:p14="http://schemas.microsoft.com/office/powerpoint/2010/main" val="1320359935"/>
-      </p:ext>
-    </p:extLst>
-  </p:cSld>
-  <p:clrMapOvr>
-    <a:masterClrMapping/>
-  </p:clrMapOvr>
-</p:notes>
-</file>
-
-<file path=ppt/notesSlides/notesSlide15.xml><?xml version="1.0" encoding="utf-8"?>
+<file path=ppt/notesSlides/notesSlide16.xml><?xml version="1.0" encoding="utf-8"?>
 <p:notes xmlns:a="http://schemas.openxmlformats.org/drawingml/2006/main" xmlns:r="http://schemas.openxmlformats.org/officeDocument/2006/relationships" xmlns:p="http://schemas.openxmlformats.org/presentationml/2006/main" showMasterSp="0" showMasterPhAnim="0">
   <p:cSld>
     <p:spTree>
@@ -1861,7 +1948,7 @@
   <p:cSld>
     <p:spTree>
       <p:nvGrpSpPr>
-        <p:cNvPr id="1" name="Shape 103"/>
+        <p:cNvPr id="1" name="Shape 151"/>
         <p:cNvGrpSpPr/>
         <p:nvPr/>
       </p:nvGrpSpPr>
@@ -1875,7 +1962,7 @@
       </p:grpSpPr>
       <p:sp>
         <p:nvSpPr>
-          <p:cNvPr id="104" name="Shape 104"/>
+          <p:cNvPr id="152" name="Shape 152"/>
           <p:cNvSpPr>
             <a:spLocks noGrp="1" noRot="1" noChangeAspect="1"/>
           </p:cNvSpPr>
@@ -1916,7 +2003,7 @@
       </p:sp>
       <p:sp>
         <p:nvSpPr>
-          <p:cNvPr id="105" name="Shape 105"/>
+          <p:cNvPr id="153" name="Shape 153"/>
           <p:cNvSpPr txBox="1">
             <a:spLocks noGrp="1"/>
           </p:cNvSpPr>
@@ -1945,17 +2032,14 @@
               </a:spcBef>
               <a:buNone/>
             </a:pPr>
-            <a:r>
-              <a:rPr lang="en"/>
-              <a:t>You can read more details in this nice paper by Matt Kusner</a:t>
-            </a:r>
+            <a:endParaRPr/>
           </a:p>
         </p:txBody>
       </p:sp>
     </p:spTree>
     <p:extLst>
       <p:ext uri="{BB962C8B-B14F-4D97-AF65-F5344CB8AC3E}">
-        <p14:creationId xmlns:p14="http://schemas.microsoft.com/office/powerpoint/2010/main" val="129872964"/>
+        <p14:creationId xmlns:p14="http://schemas.microsoft.com/office/powerpoint/2010/main" val="1950325884"/>
       </p:ext>
     </p:extLst>
   </p:cSld>
@@ -1970,7 +2054,7 @@
   <p:cSld>
     <p:spTree>
       <p:nvGrpSpPr>
-        <p:cNvPr id="1" name="Shape 110"/>
+        <p:cNvPr id="1" name="Shape 159"/>
         <p:cNvGrpSpPr/>
         <p:nvPr/>
       </p:nvGrpSpPr>
@@ -1984,7 +2068,7 @@
       </p:grpSpPr>
       <p:sp>
         <p:nvSpPr>
-          <p:cNvPr id="111" name="Shape 111"/>
+          <p:cNvPr id="160" name="Shape 160"/>
           <p:cNvSpPr>
             <a:spLocks noGrp="1" noRot="1" noChangeAspect="1"/>
           </p:cNvSpPr>
@@ -2025,7 +2109,7 @@
       </p:sp>
       <p:sp>
         <p:nvSpPr>
-          <p:cNvPr id="112" name="Shape 112"/>
+          <p:cNvPr id="161" name="Shape 161"/>
           <p:cNvSpPr txBox="1">
             <a:spLocks noGrp="1"/>
           </p:cNvSpPr>
@@ -2054,17 +2138,14 @@
               </a:spcBef>
               <a:buNone/>
             </a:pPr>
-            <a:r>
-              <a:rPr lang="en"/>
-              <a:t>So how does the Word Movers Distance work? We measure the shortest way to move one sentence into another, word by word. These two sentences are actually very close because it only takes a short distance to move Sicilian to Italian, ‘gelato’ to ‘ice-cream’ and ‘rich’ into ‘velvety’.</a:t>
-            </a:r>
+            <a:endParaRPr/>
           </a:p>
         </p:txBody>
       </p:sp>
     </p:spTree>
     <p:extLst>
       <p:ext uri="{BB962C8B-B14F-4D97-AF65-F5344CB8AC3E}">
-        <p14:creationId xmlns:p14="http://schemas.microsoft.com/office/powerpoint/2010/main" val="3820007831"/>
+        <p14:creationId xmlns:p14="http://schemas.microsoft.com/office/powerpoint/2010/main" val="1320359935"/>
       </p:ext>
     </p:extLst>
   </p:cSld>
@@ -2075,11 +2156,11 @@
 </file>
 
 <file path=ppt/notesSlides/notesSlide8.xml><?xml version="1.0" encoding="utf-8"?>
-<p:notes xmlns:a="http://schemas.openxmlformats.org/drawingml/2006/main" xmlns:r="http://schemas.openxmlformats.org/officeDocument/2006/relationships" xmlns:p="http://schemas.openxmlformats.org/presentationml/2006/main">
+<p:notes xmlns:a="http://schemas.openxmlformats.org/drawingml/2006/main" xmlns:r="http://schemas.openxmlformats.org/officeDocument/2006/relationships" xmlns:p="http://schemas.openxmlformats.org/presentationml/2006/main" showMasterSp="0" showMasterPhAnim="0">
   <p:cSld>
     <p:spTree>
       <p:nvGrpSpPr>
-        <p:cNvPr id="1" name=""/>
+        <p:cNvPr id="1" name="Shape 103"/>
         <p:cNvGrpSpPr/>
         <p:nvPr/>
       </p:nvGrpSpPr>
@@ -2093,76 +2174,7 @@
       </p:grpSpPr>
       <p:sp>
         <p:nvSpPr>
-          <p:cNvPr id="2" name="Slide Image Placeholder 1"/>
-          <p:cNvSpPr>
-            <a:spLocks noGrp="1" noRot="1" noChangeAspect="1"/>
-          </p:cNvSpPr>
-          <p:nvPr>
-            <p:ph type="sldImg"/>
-          </p:nvPr>
-        </p:nvSpPr>
-        <p:spPr/>
-      </p:sp>
-      <p:sp>
-        <p:nvSpPr>
-          <p:cNvPr id="3" name="Notes Placeholder 2"/>
-          <p:cNvSpPr>
-            <a:spLocks noGrp="1"/>
-          </p:cNvSpPr>
-          <p:nvPr>
-            <p:ph type="body" idx="1"/>
-          </p:nvPr>
-        </p:nvSpPr>
-        <p:spPr/>
-        <p:txBody>
-          <a:bodyPr/>
-          <a:lstStyle/>
-          <a:p>
-            <a:r>
-              <a:rPr lang="en-IN" dirty="0" smtClean="0"/>
-              <a:t>This</a:t>
-            </a:r>
-            <a:r>
-              <a:rPr lang="en-IN" baseline="0" dirty="0" smtClean="0"/>
-              <a:t> is a plot of WMD(blue), WCD(Black), RWMD(red) distances of a query sentence with all the documents, arranged in ascending order. These lower bounds can be used to make reduce the computations of WMD. For more details you can refer to the paper.</a:t>
-            </a:r>
-            <a:endParaRPr lang="en-IN" dirty="0"/>
-          </a:p>
-        </p:txBody>
-      </p:sp>
-    </p:spTree>
-    <p:extLst>
-      <p:ext uri="{BB962C8B-B14F-4D97-AF65-F5344CB8AC3E}">
-        <p14:creationId xmlns:p14="http://schemas.microsoft.com/office/powerpoint/2010/main" val="3309724259"/>
-      </p:ext>
-    </p:extLst>
-  </p:cSld>
-  <p:clrMapOvr>
-    <a:masterClrMapping/>
-  </p:clrMapOvr>
-</p:notes>
-</file>
-
-<file path=ppt/notesSlides/notesSlide9.xml><?xml version="1.0" encoding="utf-8"?>
-<p:notes xmlns:a="http://schemas.openxmlformats.org/drawingml/2006/main" xmlns:r="http://schemas.openxmlformats.org/officeDocument/2006/relationships" xmlns:p="http://schemas.openxmlformats.org/presentationml/2006/main" showMasterSp="0" showMasterPhAnim="0">
-  <p:cSld>
-    <p:spTree>
-      <p:nvGrpSpPr>
-        <p:cNvPr id="1" name="Shape 123"/>
-        <p:cNvGrpSpPr/>
-        <p:nvPr/>
-      </p:nvGrpSpPr>
-      <p:grpSpPr>
-        <a:xfrm>
-          <a:off x="0" y="0"/>
-          <a:ext cx="0" cy="0"/>
-          <a:chOff x="0" y="0"/>
-          <a:chExt cx="0" cy="0"/>
-        </a:xfrm>
-      </p:grpSpPr>
-      <p:sp>
-        <p:nvSpPr>
-          <p:cNvPr id="124" name="Shape 124"/>
+          <p:cNvPr id="104" name="Shape 104"/>
           <p:cNvSpPr>
             <a:spLocks noGrp="1" noRot="1" noChangeAspect="1"/>
           </p:cNvSpPr>
@@ -2203,7 +2215,7 @@
       </p:sp>
       <p:sp>
         <p:nvSpPr>
-          <p:cNvPr id="125" name="Shape 125"/>
+          <p:cNvPr id="105" name="Shape 105"/>
           <p:cNvSpPr txBox="1">
             <a:spLocks noGrp="1"/>
           </p:cNvSpPr>
@@ -2226,60 +2238,6 @@
           </a:bodyPr>
           <a:lstStyle/>
           <a:p>
-            <a:pPr lvl="0" rtl="0">
-              <a:spcBef>
-                <a:spcPts val="0"/>
-              </a:spcBef>
-              <a:buNone/>
-            </a:pPr>
-            <a:r>
-              <a:rPr lang="en" dirty="0"/>
-              <a:t>Here is the gensim API for finding similar reviews. We trained it on Yelp reviews of a popular Las Vegas joint that doesn’t  have ice cream unfortunately but has a great view.</a:t>
-            </a:r>
-          </a:p>
-          <a:p>
-            <a:pPr lvl="0" rtl="0">
-              <a:spcBef>
-                <a:spcPts val="0"/>
-              </a:spcBef>
-              <a:buNone/>
-            </a:pPr>
-            <a:endParaRPr dirty="0"/>
-          </a:p>
-          <a:p>
-            <a:pPr lvl="0" rtl="0">
-              <a:spcBef>
-                <a:spcPts val="0"/>
-              </a:spcBef>
-              <a:buNone/>
-            </a:pPr>
-            <a:r>
-              <a:rPr lang="en" dirty="0"/>
-              <a:t>The question is “What reviews are most similar to “Very good, you should seat outdoor’?”</a:t>
-            </a:r>
-          </a:p>
-          <a:p>
-            <a:pPr lvl="0" rtl="0">
-              <a:spcBef>
-                <a:spcPts val="0"/>
-              </a:spcBef>
-              <a:buNone/>
-            </a:pPr>
-            <a:r>
-              <a:rPr lang="en" dirty="0"/>
-              <a:t>You can see the answers here together with their similarity scores(higher values mean more similar). </a:t>
-            </a:r>
-          </a:p>
-          <a:p>
-            <a:pPr lvl="0" rtl="0">
-              <a:spcBef>
-                <a:spcPts val="0"/>
-              </a:spcBef>
-              <a:buNone/>
-            </a:pPr>
-            <a:endParaRPr dirty="0"/>
-          </a:p>
-          <a:p>
             <a:pPr lvl="0">
               <a:spcBef>
                 <a:spcPts val="0"/>
@@ -2287,8 +2245,8 @@
               <a:buNone/>
             </a:pPr>
             <a:r>
-              <a:rPr lang="en" dirty="0"/>
-              <a:t>The first match doesn’t contain a single word in common with our query!</a:t>
+              <a:rPr lang="en"/>
+              <a:t>You can read more details in this nice paper by Matt Kusner</a:t>
             </a:r>
           </a:p>
         </p:txBody>
@@ -2296,7 +2254,116 @@
     </p:spTree>
     <p:extLst>
       <p:ext uri="{BB962C8B-B14F-4D97-AF65-F5344CB8AC3E}">
-        <p14:creationId xmlns:p14="http://schemas.microsoft.com/office/powerpoint/2010/main" val="894464740"/>
+        <p14:creationId xmlns:p14="http://schemas.microsoft.com/office/powerpoint/2010/main" val="129872964"/>
+      </p:ext>
+    </p:extLst>
+  </p:cSld>
+  <p:clrMapOvr>
+    <a:masterClrMapping/>
+  </p:clrMapOvr>
+</p:notes>
+</file>
+
+<file path=ppt/notesSlides/notesSlide9.xml><?xml version="1.0" encoding="utf-8"?>
+<p:notes xmlns:a="http://schemas.openxmlformats.org/drawingml/2006/main" xmlns:r="http://schemas.openxmlformats.org/officeDocument/2006/relationships" xmlns:p="http://schemas.openxmlformats.org/presentationml/2006/main" showMasterSp="0" showMasterPhAnim="0">
+  <p:cSld>
+    <p:spTree>
+      <p:nvGrpSpPr>
+        <p:cNvPr id="1" name="Shape 110"/>
+        <p:cNvGrpSpPr/>
+        <p:nvPr/>
+      </p:nvGrpSpPr>
+      <p:grpSpPr>
+        <a:xfrm>
+          <a:off x="0" y="0"/>
+          <a:ext cx="0" cy="0"/>
+          <a:chOff x="0" y="0"/>
+          <a:chExt cx="0" cy="0"/>
+        </a:xfrm>
+      </p:grpSpPr>
+      <p:sp>
+        <p:nvSpPr>
+          <p:cNvPr id="111" name="Shape 111"/>
+          <p:cNvSpPr>
+            <a:spLocks noGrp="1" noRot="1" noChangeAspect="1"/>
+          </p:cNvSpPr>
+          <p:nvPr>
+            <p:ph type="sldImg" idx="2"/>
+          </p:nvPr>
+        </p:nvSpPr>
+        <p:spPr>
+          <a:xfrm>
+            <a:off x="381000" y="685800"/>
+            <a:ext cx="6096000" cy="3429000"/>
+          </a:xfrm>
+          <a:custGeom>
+            <a:avLst/>
+            <a:gdLst/>
+            <a:ahLst/>
+            <a:cxnLst/>
+            <a:rect l="0" t="0" r="0" b="0"/>
+            <a:pathLst>
+              <a:path w="120000" h="120000" extrusionOk="0">
+                <a:moveTo>
+                  <a:pt x="0" y="0"/>
+                </a:moveTo>
+                <a:lnTo>
+                  <a:pt x="120000" y="0"/>
+                </a:lnTo>
+                <a:lnTo>
+                  <a:pt x="120000" y="120000"/>
+                </a:lnTo>
+                <a:lnTo>
+                  <a:pt x="0" y="120000"/>
+                </a:lnTo>
+                <a:close/>
+              </a:path>
+            </a:pathLst>
+          </a:custGeom>
+        </p:spPr>
+      </p:sp>
+      <p:sp>
+        <p:nvSpPr>
+          <p:cNvPr id="112" name="Shape 112"/>
+          <p:cNvSpPr txBox="1">
+            <a:spLocks noGrp="1"/>
+          </p:cNvSpPr>
+          <p:nvPr>
+            <p:ph type="body" idx="1"/>
+          </p:nvPr>
+        </p:nvSpPr>
+        <p:spPr>
+          <a:xfrm>
+            <a:off x="685800" y="4343400"/>
+            <a:ext cx="5486400" cy="4114800"/>
+          </a:xfrm>
+          <a:prstGeom prst="rect">
+            <a:avLst/>
+          </a:prstGeom>
+        </p:spPr>
+        <p:txBody>
+          <a:bodyPr lIns="91425" tIns="91425" rIns="91425" bIns="91425" anchor="t" anchorCtr="0">
+            <a:noAutofit/>
+          </a:bodyPr>
+          <a:lstStyle/>
+          <a:p>
+            <a:pPr lvl="0">
+              <a:spcBef>
+                <a:spcPts val="0"/>
+              </a:spcBef>
+              <a:buNone/>
+            </a:pPr>
+            <a:r>
+              <a:rPr lang="en"/>
+              <a:t>So how does the Word Movers Distance work? We measure the shortest way to move one sentence into another, word by word. These two sentences are actually very close because it only takes a short distance to move Sicilian to Italian, ‘gelato’ to ‘ice-cream’ and ‘rich’ into ‘velvety’.</a:t>
+            </a:r>
+          </a:p>
+        </p:txBody>
+      </p:sp>
+    </p:spTree>
+    <p:extLst>
+      <p:ext uri="{BB962C8B-B14F-4D97-AF65-F5344CB8AC3E}">
+        <p14:creationId xmlns:p14="http://schemas.microsoft.com/office/powerpoint/2010/main" val="3820007831"/>
       </p:ext>
     </p:extLst>
   </p:cSld>
@@ -5685,11 +5752,7 @@
             </a:pPr>
             <a:r>
               <a:rPr lang="en" sz="4500" dirty="0" smtClean="0"/>
-              <a:t>Word </a:t>
-            </a:r>
-            <a:r>
-              <a:rPr lang="en" sz="4500" dirty="0" smtClean="0"/>
-              <a:t>Mover’s Distance</a:t>
+              <a:t>Word Mover’s Distance</a:t>
             </a:r>
           </a:p>
           <a:p>
@@ -5759,22 +5822,31 @@
             <a:r>
               <a:rPr lang="en" sz="2400" dirty="0" smtClean="0">
                 <a:solidFill>
-                  <a:srgbClr val="333333"/>
+                  <a:schemeClr val="tx1">
+                    <a:lumMod val="95000"/>
+                    <a:lumOff val="5000"/>
+                  </a:schemeClr>
                 </a:solidFill>
                 <a:highlight>
                   <a:srgbClr val="FFFFFF"/>
                 </a:highlight>
               </a:rPr>
-              <a:t>Rishab Goel</a:t>
-            </a:r>
-            <a:endParaRPr lang="en" sz="2400" dirty="0">
-              <a:solidFill>
-                <a:srgbClr val="333333"/>
-              </a:solidFill>
-              <a:highlight>
-                <a:srgbClr val="FFFFFF"/>
-              </a:highlight>
-            </a:endParaRPr>
+              <a:t>Rishab </a:t>
+            </a:r>
+            <a:r>
+              <a:rPr lang="en" sz="2400" dirty="0" smtClean="0">
+                <a:solidFill>
+                  <a:schemeClr val="tx1">
+                    <a:lumMod val="95000"/>
+                    <a:lumOff val="5000"/>
+                  </a:schemeClr>
+                </a:solidFill>
+                <a:highlight>
+                  <a:srgbClr val="FFFFFF"/>
+                </a:highlight>
+              </a:rPr>
+              <a:t>Goel</a:t>
+            </a:r>
           </a:p>
           <a:p>
             <a:pPr lvl="0" rtl="0">
@@ -5797,28 +5869,23 @@
             <a:r>
               <a:rPr lang="en" sz="2400" dirty="0" smtClean="0">
                 <a:solidFill>
-                  <a:srgbClr val="333333"/>
+                  <a:schemeClr val="tx1">
+                    <a:lumMod val="95000"/>
+                    <a:lumOff val="5000"/>
+                  </a:schemeClr>
                 </a:solidFill>
                 <a:highlight>
                   <a:srgbClr val="FFFFFF"/>
                 </a:highlight>
               </a:rPr>
-              <a:t>Masters </a:t>
-            </a:r>
-            <a:r>
-              <a:rPr lang="en" sz="2400" dirty="0" smtClean="0">
-                <a:solidFill>
-                  <a:srgbClr val="333333"/>
-                </a:solidFill>
-                <a:highlight>
-                  <a:srgbClr val="FFFFFF"/>
-                </a:highlight>
-              </a:rPr>
-              <a:t>CS @ IIT Delhi</a:t>
+              <a:t>RaRe Data Science Incubator Student</a:t>
             </a:r>
             <a:endParaRPr lang="en" sz="2400" dirty="0">
               <a:solidFill>
-                <a:srgbClr val="333333"/>
+                <a:schemeClr val="tx1">
+                  <a:lumMod val="95000"/>
+                  <a:lumOff val="5000"/>
+                </a:schemeClr>
               </a:solidFill>
               <a:highlight>
                 <a:srgbClr val="FFFFFF"/>
@@ -5846,17 +5913,37 @@
             <a:r>
               <a:rPr lang="en" sz="2400" dirty="0" smtClean="0">
                 <a:solidFill>
-                  <a:srgbClr val="333333"/>
+                  <a:schemeClr val="tx1">
+                    <a:lumMod val="95000"/>
+                    <a:lumOff val="5000"/>
+                  </a:schemeClr>
                 </a:solidFill>
                 <a:highlight>
                   <a:srgbClr val="FFFFFF"/>
                 </a:highlight>
               </a:rPr>
-              <a:t>@RishabGoel</a:t>
+              <a:t>@</a:t>
+            </a:r>
+            <a:r>
+              <a:rPr lang="en" sz="2400" dirty="0" smtClean="0">
+                <a:solidFill>
+                  <a:schemeClr val="tx1">
+                    <a:lumMod val="95000"/>
+                    <a:lumOff val="5000"/>
+                  </a:schemeClr>
+                </a:solidFill>
+                <a:highlight>
+                  <a:srgbClr val="FFFFFF"/>
+                </a:highlight>
+              </a:rPr>
+              <a:t>RishabGoel</a:t>
             </a:r>
             <a:endParaRPr lang="en" sz="2400" dirty="0">
               <a:solidFill>
-                <a:srgbClr val="333333"/>
+                <a:schemeClr val="tx1">
+                  <a:lumMod val="95000"/>
+                  <a:lumOff val="5000"/>
+                </a:schemeClr>
               </a:solidFill>
               <a:highlight>
                 <a:srgbClr val="FFFFFF"/>
@@ -5885,7 +5972,7 @@
   <p:cSld>
     <p:spTree>
       <p:nvGrpSpPr>
-        <p:cNvPr id="1" name="Shape 134"/>
+        <p:cNvPr id="1" name=""/>
         <p:cNvGrpSpPr/>
         <p:nvPr/>
       </p:nvGrpSpPr>
@@ -5897,117 +5984,124 @@
           <a:chExt cx="0" cy="0"/>
         </a:xfrm>
       </p:grpSpPr>
-      <p:sp>
-        <p:nvSpPr>
-          <p:cNvPr id="135" name="Shape 135"/>
-          <p:cNvSpPr txBox="1">
-            <a:spLocks noGrp="1"/>
-          </p:cNvSpPr>
-          <p:nvPr>
-            <p:ph type="title"/>
-          </p:nvPr>
-        </p:nvSpPr>
-        <p:spPr>
-          <a:xfrm>
-            <a:off x="0" y="80325"/>
-            <a:ext cx="8520600" cy="572700"/>
-          </a:xfrm>
-          <a:prstGeom prst="rect">
-            <a:avLst/>
-          </a:prstGeom>
+      <p:pic>
+        <p:nvPicPr>
+          <p:cNvPr id="3" name="Picture 2"/>
+          <p:cNvPicPr>
+            <a:picLocks noChangeAspect="1"/>
+          </p:cNvPicPr>
+          <p:nvPr/>
+        </p:nvPicPr>
+        <p:blipFill>
+          <a:blip r:embed="rId3"/>
+          <a:stretch>
+            <a:fillRect/>
+          </a:stretch>
+        </p:blipFill>
+        <p:spPr>
+          <a:xfrm>
+            <a:off x="335452" y="1938749"/>
+            <a:ext cx="4533432" cy="2336367"/>
+          </a:xfrm>
+          <a:prstGeom prst="rect">
+            <a:avLst/>
+          </a:prstGeom>
+        </p:spPr>
+      </p:pic>
+      <p:pic>
+        <p:nvPicPr>
+          <p:cNvPr id="4" name="Picture 3"/>
+          <p:cNvPicPr>
+            <a:picLocks noChangeAspect="1"/>
+          </p:cNvPicPr>
+          <p:nvPr/>
+        </p:nvPicPr>
+        <p:blipFill>
+          <a:blip r:embed="rId4"/>
+          <a:stretch>
+            <a:fillRect/>
+          </a:stretch>
+        </p:blipFill>
+        <p:spPr>
+          <a:xfrm>
+            <a:off x="5094514" y="1938749"/>
+            <a:ext cx="3660646" cy="2337094"/>
+          </a:xfrm>
+          <a:prstGeom prst="rect">
+            <a:avLst/>
+          </a:prstGeom>
+        </p:spPr>
+      </p:pic>
+      <p:sp>
+        <p:nvSpPr>
+          <p:cNvPr id="5" name="TextBox 4"/>
+          <p:cNvSpPr txBox="1"/>
+          <p:nvPr/>
+        </p:nvSpPr>
+        <p:spPr>
+          <a:xfrm>
+            <a:off x="118753" y="771896"/>
+            <a:ext cx="4405746" cy="400110"/>
+          </a:xfrm>
+          <a:prstGeom prst="rect">
+            <a:avLst/>
+          </a:prstGeom>
+          <a:noFill/>
         </p:spPr>
         <p:txBody>
-          <a:bodyPr lIns="91425" tIns="91425" rIns="91425" bIns="91425" anchor="t" anchorCtr="0">
-            <a:noAutofit/>
-          </a:bodyPr>
-          <a:lstStyle/>
-          <a:p>
-            <a:pPr lvl="0" algn="ctr" rtl="0">
-              <a:spcBef>
-                <a:spcPts val="0"/>
-              </a:spcBef>
-              <a:buNone/>
-            </a:pPr>
-            <a:r>
-              <a:rPr lang="en" sz="7200" dirty="0"/>
-              <a:t>Thanks!</a:t>
-            </a:r>
-          </a:p>
-        </p:txBody>
-      </p:sp>
-      <p:sp>
-        <p:nvSpPr>
-          <p:cNvPr id="2" name="Text Placeholder 1"/>
-          <p:cNvSpPr>
-            <a:spLocks noGrp="1"/>
-          </p:cNvSpPr>
-          <p:nvPr>
-            <p:ph type="body" idx="1"/>
-          </p:nvPr>
-        </p:nvSpPr>
-        <p:spPr>
-          <a:xfrm>
-            <a:off x="270604" y="1820297"/>
-            <a:ext cx="8520600" cy="3416400"/>
-          </a:xfrm>
-        </p:spPr>
-        <p:txBody>
-          <a:bodyPr/>
-          <a:lstStyle/>
-          <a:p>
-            <a:pPr algn="ctr"/>
-            <a:r>
-              <a:rPr lang="en-IN" sz="2400" dirty="0" smtClean="0"/>
-              <a:t>Link to the Slides</a:t>
-            </a:r>
-            <a:endParaRPr lang="en-IN" sz="2400" dirty="0"/>
-          </a:p>
-        </p:txBody>
-      </p:sp>
-      <p:sp>
-        <p:nvSpPr>
-          <p:cNvPr id="3" name="Rectangle 2"/>
-          <p:cNvSpPr/>
-          <p:nvPr/>
-        </p:nvSpPr>
-        <p:spPr>
-          <a:xfrm>
-            <a:off x="1810387" y="2999752"/>
-            <a:ext cx="5857694" cy="400110"/>
-          </a:xfrm>
-          <a:prstGeom prst="rect">
-            <a:avLst/>
-          </a:prstGeom>
-        </p:spPr>
-        <p:txBody>
-          <a:bodyPr wrap="none">
+          <a:bodyPr wrap="square" rtlCol="0">
             <a:spAutoFit/>
           </a:bodyPr>
           <a:lstStyle/>
           <a:p>
             <a:r>
-              <a:rPr lang="en-IN" sz="2000" dirty="0">
-                <a:solidFill>
-                  <a:srgbClr val="FF0000"/>
-                </a:solidFill>
-              </a:rPr>
-              <a:t>https://github.com/RishabGoel/pycon_india_slides</a:t>
-            </a:r>
+              <a:rPr lang="en-IN" sz="2000" b="1" dirty="0" smtClean="0"/>
+              <a:t>Relaxed Word Mover’s Distance</a:t>
+            </a:r>
+            <a:endParaRPr lang="en-IN" sz="2000" b="1" dirty="0"/>
           </a:p>
         </p:txBody>
       </p:sp>
+      <p:sp>
+        <p:nvSpPr>
+          <p:cNvPr id="6" name="TextBox 5"/>
+          <p:cNvSpPr txBox="1"/>
+          <p:nvPr/>
+        </p:nvSpPr>
+        <p:spPr>
+          <a:xfrm>
+            <a:off x="4975762" y="771895"/>
+            <a:ext cx="3779398" cy="369332"/>
+          </a:xfrm>
+          <a:prstGeom prst="rect">
+            <a:avLst/>
+          </a:prstGeom>
+          <a:noFill/>
+        </p:spPr>
+        <p:txBody>
+          <a:bodyPr wrap="square" rtlCol="0">
+            <a:spAutoFit/>
+          </a:bodyPr>
+          <a:lstStyle/>
+          <a:p>
+            <a:r>
+              <a:rPr lang="en-IN" sz="1800" b="1" dirty="0" smtClean="0"/>
+              <a:t>Relaxed Word Centroid Distance</a:t>
+            </a:r>
+            <a:endParaRPr lang="en-IN" sz="1800" b="1" dirty="0"/>
+          </a:p>
+        </p:txBody>
+      </p:sp>
     </p:spTree>
+    <p:extLst>
+      <p:ext uri="{BB962C8B-B14F-4D97-AF65-F5344CB8AC3E}">
+        <p14:creationId xmlns:p14="http://schemas.microsoft.com/office/powerpoint/2010/main" val="772433701"/>
+      </p:ext>
+    </p:extLst>
   </p:cSld>
   <p:clrMapOvr>
     <a:masterClrMapping/>
   </p:clrMapOvr>
-  <p:timing>
-    <p:tnLst>
-      <p:par>
-        <p:cTn id="1" dur="indefinite" restart="never" nodeType="tmRoot"/>
-      </p:par>
-    </p:tnLst>
-  </p:timing>
 </p:sld>
 </file>
 
@@ -6016,7 +6110,7 @@
   <p:cSld>
     <p:spTree>
       <p:nvGrpSpPr>
-        <p:cNvPr id="1" name="Shape 142"/>
+        <p:cNvPr id="1" name=""/>
         <p:cNvGrpSpPr/>
         <p:nvPr/>
       </p:nvGrpSpPr>
@@ -6030,78 +6124,136 @@
       </p:grpSpPr>
       <p:sp>
         <p:nvSpPr>
-          <p:cNvPr id="143" name="Shape 143"/>
-          <p:cNvSpPr txBox="1">
+          <p:cNvPr id="2" name="Title 1"/>
+          <p:cNvSpPr>
             <a:spLocks noGrp="1"/>
           </p:cNvSpPr>
           <p:nvPr>
-            <p:ph type="ctrTitle"/>
+            <p:ph type="title"/>
           </p:nvPr>
         </p:nvSpPr>
         <p:spPr>
           <a:xfrm>
-            <a:off x="311708" y="744575"/>
-            <a:ext cx="8520600" cy="2052600"/>
-          </a:xfrm>
-          <a:prstGeom prst="rect">
-            <a:avLst/>
-          </a:prstGeom>
+            <a:off x="311700" y="298298"/>
+            <a:ext cx="8520600" cy="1445105"/>
+          </a:xfrm>
         </p:spPr>
         <p:txBody>
-          <a:bodyPr lIns="91425" tIns="91425" rIns="91425" bIns="91425" anchor="b" anchorCtr="0">
-            <a:noAutofit/>
+          <a:bodyPr/>
+          <a:lstStyle/>
+          <a:p>
+            <a:pPr algn="l"/>
+            <a:r>
+              <a:rPr lang="en-IN" sz="2400" dirty="0" smtClean="0"/>
+              <a:t>Word Centroid Distance is a </a:t>
+            </a:r>
+            <a:r>
+              <a:rPr lang="en-IN" sz="2400" dirty="0"/>
+              <a:t>l</a:t>
+            </a:r>
+            <a:r>
+              <a:rPr lang="en-IN" sz="2400" dirty="0" smtClean="0"/>
+              <a:t>ower bound</a:t>
+            </a:r>
+            <a:br>
+              <a:rPr lang="en-IN" sz="2400" dirty="0" smtClean="0"/>
+            </a:br>
+            <a:r>
+              <a:rPr lang="en-IN" sz="2400" dirty="0" smtClean="0"/>
+              <a:t>Relaxed Word Mover’s Distance is a tighter bound</a:t>
+            </a:r>
+            <a:endParaRPr lang="en-IN" sz="2400" dirty="0"/>
+          </a:p>
+        </p:txBody>
+      </p:sp>
+      <p:pic>
+        <p:nvPicPr>
+          <p:cNvPr id="4" name="Picture 3"/>
+          <p:cNvPicPr>
+            <a:picLocks noChangeAspect="1"/>
+          </p:cNvPicPr>
+          <p:nvPr/>
+        </p:nvPicPr>
+        <p:blipFill>
+          <a:blip r:embed="rId3"/>
+          <a:stretch>
+            <a:fillRect/>
+          </a:stretch>
+        </p:blipFill>
+        <p:spPr>
+          <a:xfrm>
+            <a:off x="5312715" y="2478826"/>
+            <a:ext cx="1669976" cy="1463782"/>
+          </a:xfrm>
+          <a:prstGeom prst="rect">
+            <a:avLst/>
+          </a:prstGeom>
+        </p:spPr>
+      </p:pic>
+      <p:pic>
+        <p:nvPicPr>
+          <p:cNvPr id="5" name="Picture 4"/>
+          <p:cNvPicPr>
+            <a:picLocks noChangeAspect="1"/>
+          </p:cNvPicPr>
+          <p:nvPr/>
+        </p:nvPicPr>
+        <p:blipFill>
+          <a:blip r:embed="rId4"/>
+          <a:stretch>
+            <a:fillRect/>
+          </a:stretch>
+        </p:blipFill>
+        <p:spPr>
+          <a:xfrm>
+            <a:off x="641729" y="1948613"/>
+            <a:ext cx="3404807" cy="2599636"/>
+          </a:xfrm>
+          <a:prstGeom prst="rect">
+            <a:avLst/>
+          </a:prstGeom>
+        </p:spPr>
+      </p:pic>
+      <p:sp>
+        <p:nvSpPr>
+          <p:cNvPr id="7" name="Rectangle 6"/>
+          <p:cNvSpPr/>
+          <p:nvPr/>
+        </p:nvSpPr>
+        <p:spPr>
+          <a:xfrm>
+            <a:off x="4417625" y="4543547"/>
+            <a:ext cx="4370107" cy="307777"/>
+          </a:xfrm>
+          <a:prstGeom prst="rect">
+            <a:avLst/>
+          </a:prstGeom>
+        </p:spPr>
+        <p:txBody>
+          <a:bodyPr wrap="none">
+            <a:spAutoFit/>
           </a:bodyPr>
           <a:lstStyle/>
           <a:p>
-            <a:pPr lvl="0" rtl="0">
-              <a:spcBef>
-                <a:spcPts val="0"/>
-              </a:spcBef>
-              <a:buNone/>
-            </a:pPr>
-            <a:r>
-              <a:rPr lang="en"/>
-              <a:t>Extra slides</a:t>
+            <a:pPr lvl="0"/>
+            <a:r>
+              <a:rPr lang="en" u="sng" dirty="0">
+                <a:solidFill>
+                  <a:schemeClr val="hlink"/>
+                </a:solidFill>
+                <a:hlinkClick r:id="rId5"/>
+              </a:rPr>
+              <a:t>http://jmlr.org/proceedings/papers/v37/kusnerb15.pdf</a:t>
             </a:r>
           </a:p>
         </p:txBody>
       </p:sp>
-      <p:sp>
-        <p:nvSpPr>
-          <p:cNvPr id="144" name="Shape 144"/>
-          <p:cNvSpPr txBox="1">
-            <a:spLocks noGrp="1"/>
-          </p:cNvSpPr>
-          <p:nvPr>
-            <p:ph type="subTitle" idx="1"/>
-          </p:nvPr>
-        </p:nvSpPr>
-        <p:spPr>
-          <a:xfrm>
-            <a:off x="311700" y="2834125"/>
-            <a:ext cx="8520600" cy="792600"/>
-          </a:xfrm>
-          <a:prstGeom prst="rect">
-            <a:avLst/>
-          </a:prstGeom>
-        </p:spPr>
-        <p:txBody>
-          <a:bodyPr lIns="91425" tIns="91425" rIns="91425" bIns="91425" anchor="t" anchorCtr="0">
-            <a:noAutofit/>
-          </a:bodyPr>
-          <a:lstStyle/>
-          <a:p>
-            <a:pPr lvl="0" rtl="0">
-              <a:spcBef>
-                <a:spcPts val="0"/>
-              </a:spcBef>
-              <a:buNone/>
-            </a:pPr>
-            <a:endParaRPr/>
-          </a:p>
-        </p:txBody>
-      </p:sp>
     </p:spTree>
+    <p:extLst>
+      <p:ext uri="{BB962C8B-B14F-4D97-AF65-F5344CB8AC3E}">
+        <p14:creationId xmlns:p14="http://schemas.microsoft.com/office/powerpoint/2010/main" val="1798281980"/>
+      </p:ext>
+    </p:extLst>
   </p:cSld>
   <p:clrMapOvr>
     <a:masterClrMapping/>
@@ -6121,7 +6273,7 @@
   <p:cSld>
     <p:spTree>
       <p:nvGrpSpPr>
-        <p:cNvPr id="1" name="Shape 148"/>
+        <p:cNvPr id="1" name="Shape 126"/>
         <p:cNvGrpSpPr/>
         <p:nvPr/>
       </p:nvGrpSpPr>
@@ -6135,7 +6287,7 @@
       </p:grpSpPr>
       <p:sp>
         <p:nvSpPr>
-          <p:cNvPr id="149" name="Shape 149"/>
+          <p:cNvPr id="127" name="Shape 127"/>
           <p:cNvSpPr txBox="1">
             <a:spLocks noGrp="1"/>
           </p:cNvSpPr>
@@ -6145,8 +6297,8 @@
         </p:nvSpPr>
         <p:spPr>
           <a:xfrm>
-            <a:off x="-17875" y="0"/>
-            <a:ext cx="9144000" cy="1112100"/>
+            <a:off x="311708" y="-301800"/>
+            <a:ext cx="8520600" cy="2052600"/>
           </a:xfrm>
           <a:prstGeom prst="rect">
             <a:avLst/>
@@ -6165,15 +6317,24 @@
               <a:buNone/>
             </a:pPr>
             <a:r>
-              <a:rPr lang="en" sz="4000"/>
-              <a:t>Ways to find similar documents</a:t>
-            </a:r>
+              <a:rPr lang="en"/>
+              <a:t>Finding similar reviews</a:t>
+            </a:r>
+          </a:p>
+          <a:p>
+            <a:pPr lvl="0">
+              <a:spcBef>
+                <a:spcPts val="0"/>
+              </a:spcBef>
+              <a:buNone/>
+            </a:pPr>
+            <a:endParaRPr/>
           </a:p>
         </p:txBody>
       </p:sp>
       <p:sp>
         <p:nvSpPr>
-          <p:cNvPr id="150" name="Shape 150"/>
+          <p:cNvPr id="128" name="Shape 128"/>
           <p:cNvSpPr txBox="1">
             <a:spLocks noGrp="1"/>
           </p:cNvSpPr>
@@ -6183,7 +6344,7 @@
         </p:nvSpPr>
         <p:spPr>
           <a:xfrm>
-            <a:off x="311700" y="1225275"/>
+            <a:off x="311700" y="1092350"/>
             <a:ext cx="8520600" cy="792600"/>
           </a:xfrm>
           <a:prstGeom prst="rect">
@@ -6196,84 +6357,171 @@
           </a:bodyPr>
           <a:lstStyle/>
           <a:p>
-            <a:pPr marL="457200" marR="0" lvl="0" indent="-406400" algn="l" rtl="0">
-              <a:lnSpc>
-                <a:spcPct val="100000"/>
-              </a:lnSpc>
-              <a:spcBef>
-                <a:spcPts val="0"/>
-              </a:spcBef>
-              <a:spcAft>
-                <a:spcPts val="0"/>
-              </a:spcAft>
+            <a:pPr lvl="0" algn="l" rtl="0">
+              <a:spcBef>
+                <a:spcPts val="0"/>
+              </a:spcBef>
               <a:buClr>
-                <a:schemeClr val="dk2"/>
+                <a:schemeClr val="dk1"/>
               </a:buClr>
-              <a:buSzPct val="100000"/>
+              <a:buSzPct val="55000"/>
               <a:buFont typeface="Arial"/>
-              <a:buChar char="●"/>
-            </a:pPr>
-            <a:r>
-              <a:rPr lang="en"/>
-              <a:t>Google’s Doc2vec</a:t>
-            </a:r>
-          </a:p>
-          <a:p>
-            <a:pPr marL="914400" marR="0" lvl="1" indent="-228600" algn="l" rtl="0">
-              <a:lnSpc>
-                <a:spcPct val="100000"/>
-              </a:lnSpc>
-              <a:spcBef>
-                <a:spcPts val="0"/>
-              </a:spcBef>
-              <a:spcAft>
-                <a:spcPts val="0"/>
-              </a:spcAft>
-              <a:buChar char="○"/>
-            </a:pPr>
-            <a:r>
-              <a:rPr lang="en"/>
-              <a:t>Built on top of word2vec </a:t>
-            </a:r>
-          </a:p>
-          <a:p>
-            <a:pPr marL="914400" marR="0" lvl="1" indent="-228600" algn="l" rtl="0">
-              <a:lnSpc>
-                <a:spcPct val="100000"/>
-              </a:lnSpc>
-              <a:spcBef>
-                <a:spcPts val="0"/>
-              </a:spcBef>
-              <a:spcAft>
-                <a:spcPts val="0"/>
-              </a:spcAft>
-              <a:buChar char="○"/>
-            </a:pPr>
-            <a:r>
-              <a:rPr lang="en"/>
-              <a:t>Document tags are just extra words in the document</a:t>
-            </a:r>
-          </a:p>
-          <a:p>
-            <a:pPr marL="0" lvl="0" indent="0" algn="l" rtl="0">
-              <a:spcBef>
-                <a:spcPts val="0"/>
-              </a:spcBef>
-              <a:buNone/>
-            </a:pPr>
-            <a:endParaRPr/>
-          </a:p>
-          <a:p>
-            <a:pPr marL="0" lvl="0" indent="0" algn="l" rtl="0">
-              <a:spcBef>
-                <a:spcPts val="0"/>
-              </a:spcBef>
-              <a:buNone/>
-            </a:pPr>
-            <a:r>
-              <a:rPr lang="en" i="1"/>
-              <a:t>Hard to tune. Slow inference.</a:t>
-            </a:r>
+              <a:buNone/>
+            </a:pPr>
+            <a:r>
+              <a:rPr lang="en" sz="2000"/>
+              <a:t>from gensim.similarities import WmdSimilarity</a:t>
+            </a:r>
+          </a:p>
+          <a:p>
+            <a:pPr lvl="0" algn="l" rtl="0">
+              <a:spcBef>
+                <a:spcPts val="0"/>
+              </a:spcBef>
+              <a:buClr>
+                <a:schemeClr val="dk1"/>
+              </a:buClr>
+              <a:buSzPct val="55000"/>
+              <a:buFont typeface="Arial"/>
+              <a:buNone/>
+            </a:pPr>
+            <a:endParaRPr sz="2000"/>
+          </a:p>
+          <a:p>
+            <a:pPr lvl="0" algn="l" rtl="0">
+              <a:spcBef>
+                <a:spcPts val="0"/>
+              </a:spcBef>
+              <a:buClr>
+                <a:schemeClr val="dk1"/>
+              </a:buClr>
+              <a:buSzPct val="55000"/>
+              <a:buFont typeface="Arial"/>
+              <a:buNone/>
+            </a:pPr>
+            <a:r>
+              <a:rPr lang="en" sz="2000"/>
+              <a:t>similiar_reviews = WmdSimilarity(reviews, model, num_best=10)</a:t>
+            </a:r>
+          </a:p>
+          <a:p>
+            <a:pPr lvl="0" algn="l" rtl="0">
+              <a:spcBef>
+                <a:spcPts val="0"/>
+              </a:spcBef>
+              <a:buNone/>
+            </a:pPr>
+            <a:r>
+              <a:rPr lang="en" sz="2000"/>
+              <a:t>similar_reviews['Very good, you should seat outdoor.']</a:t>
+            </a:r>
+          </a:p>
+          <a:p>
+            <a:pPr lvl="0" algn="l">
+              <a:spcBef>
+                <a:spcPts val="0"/>
+              </a:spcBef>
+              <a:buNone/>
+            </a:pPr>
+            <a:endParaRPr sz="2000"/>
+          </a:p>
+        </p:txBody>
+      </p:sp>
+      <p:pic>
+        <p:nvPicPr>
+          <p:cNvPr id="129" name="Shape 129"/>
+          <p:cNvPicPr preferRelativeResize="0"/>
+          <p:nvPr/>
+        </p:nvPicPr>
+        <p:blipFill>
+          <a:blip r:embed="rId3">
+            <a:alphaModFix/>
+          </a:blip>
+          <a:stretch>
+            <a:fillRect/>
+          </a:stretch>
+        </p:blipFill>
+        <p:spPr>
+          <a:xfrm>
+            <a:off x="142137" y="954025"/>
+            <a:ext cx="8859725" cy="1737200"/>
+          </a:xfrm>
+          <a:prstGeom prst="rect">
+            <a:avLst/>
+          </a:prstGeom>
+          <a:noFill/>
+          <a:ln>
+            <a:noFill/>
+          </a:ln>
+        </p:spPr>
+      </p:pic>
+      <p:pic>
+        <p:nvPicPr>
+          <p:cNvPr id="130" name="Shape 130"/>
+          <p:cNvPicPr preferRelativeResize="0"/>
+          <p:nvPr/>
+        </p:nvPicPr>
+        <p:blipFill>
+          <a:blip r:embed="rId4">
+            <a:alphaModFix/>
+          </a:blip>
+          <a:stretch>
+            <a:fillRect/>
+          </a:stretch>
+        </p:blipFill>
+        <p:spPr>
+          <a:xfrm>
+            <a:off x="368100" y="2850525"/>
+            <a:ext cx="7362875" cy="1934200"/>
+          </a:xfrm>
+          <a:prstGeom prst="rect">
+            <a:avLst/>
+          </a:prstGeom>
+          <a:noFill/>
+          <a:ln>
+            <a:noFill/>
+          </a:ln>
+        </p:spPr>
+      </p:pic>
+      <p:sp>
+        <p:nvSpPr>
+          <p:cNvPr id="2" name="Rectangle 1"/>
+          <p:cNvSpPr/>
+          <p:nvPr/>
+        </p:nvSpPr>
+        <p:spPr>
+          <a:xfrm>
+            <a:off x="41574" y="4620280"/>
+            <a:ext cx="5611230" cy="523220"/>
+          </a:xfrm>
+          <a:prstGeom prst="rect">
+            <a:avLst/>
+          </a:prstGeom>
+        </p:spPr>
+        <p:txBody>
+          <a:bodyPr wrap="square">
+            <a:spAutoFit/>
+          </a:bodyPr>
+          <a:lstStyle/>
+          <a:p>
+            <a:r>
+              <a:rPr lang="en-IN" dirty="0"/>
+              <a:t>Credits : Lev </a:t>
+            </a:r>
+            <a:r>
+              <a:rPr lang="en-IN" dirty="0" err="1"/>
+              <a:t>Konstantinovskiy</a:t>
+            </a:r>
+            <a:endParaRPr lang="en-IN" dirty="0"/>
+          </a:p>
+          <a:p>
+            <a:r>
+              <a:rPr lang="en-IN" dirty="0">
+                <a:hlinkClick r:id="rId5"/>
+              </a:rPr>
+              <a:t>https://speakerdeck.com/tmylk/same-content-different-words</a:t>
+            </a:r>
+            <a:endParaRPr lang="en-IN" dirty="0"/>
           </a:p>
         </p:txBody>
       </p:sp>
@@ -6297,7 +6545,7 @@
   <p:cSld>
     <p:spTree>
       <p:nvGrpSpPr>
-        <p:cNvPr id="1" name="Shape 154"/>
+        <p:cNvPr id="1" name="Shape 134"/>
         <p:cNvGrpSpPr/>
         <p:nvPr/>
       </p:nvGrpSpPr>
@@ -6311,75 +6559,18 @@
       </p:grpSpPr>
       <p:sp>
         <p:nvSpPr>
-          <p:cNvPr id="155" name="Shape 155"/>
+          <p:cNvPr id="135" name="Shape 135"/>
           <p:cNvSpPr txBox="1">
             <a:spLocks noGrp="1"/>
           </p:cNvSpPr>
           <p:nvPr>
-            <p:ph type="ctrTitle"/>
+            <p:ph type="title"/>
           </p:nvPr>
         </p:nvSpPr>
         <p:spPr>
           <a:xfrm>
-            <a:off x="0" y="69025"/>
-            <a:ext cx="8832300" cy="1300800"/>
-          </a:xfrm>
-          <a:prstGeom prst="rect">
-            <a:avLst/>
-          </a:prstGeom>
-        </p:spPr>
-        <p:txBody>
-          <a:bodyPr lIns="91425" tIns="91425" rIns="91425" bIns="91425" anchor="b" anchorCtr="0">
-            <a:noAutofit/>
-          </a:bodyPr>
-          <a:lstStyle/>
-          <a:p>
-            <a:pPr lvl="0" rtl="0">
-              <a:spcBef>
-                <a:spcPts val="0"/>
-              </a:spcBef>
-              <a:buNone/>
-            </a:pPr>
-            <a:r>
-              <a:rPr lang="en" sz="4000"/>
-              <a:t>Earth Mover’s Distance</a:t>
-            </a:r>
-          </a:p>
-          <a:p>
-            <a:pPr lvl="0">
-              <a:spcBef>
-                <a:spcPts val="0"/>
-              </a:spcBef>
-              <a:buNone/>
-            </a:pPr>
-            <a:r>
-              <a:rPr lang="en" sz="2200">
-                <a:solidFill>
-                  <a:srgbClr val="222222"/>
-                </a:solidFill>
-                <a:highlight>
-                  <a:srgbClr val="FFFFFF"/>
-                </a:highlight>
-              </a:rPr>
-              <a:t>How do you best move piles of sand to fill up holes of the same total volume? </a:t>
-            </a:r>
-          </a:p>
-        </p:txBody>
-      </p:sp>
-      <p:sp>
-        <p:nvSpPr>
-          <p:cNvPr id="156" name="Shape 156"/>
-          <p:cNvSpPr txBox="1">
-            <a:spLocks noGrp="1"/>
-          </p:cNvSpPr>
-          <p:nvPr>
-            <p:ph type="subTitle" idx="1"/>
-          </p:nvPr>
-        </p:nvSpPr>
-        <p:spPr>
-          <a:xfrm>
-            <a:off x="0" y="4483300"/>
-            <a:ext cx="9144000" cy="936600"/>
+            <a:off x="0" y="80325"/>
+            <a:ext cx="8520600" cy="572700"/>
           </a:xfrm>
           <a:prstGeom prst="rect">
             <a:avLst/>
@@ -6391,111 +6582,76 @@
           </a:bodyPr>
           <a:lstStyle/>
           <a:p>
-            <a:pPr lvl="0" algn="l" rtl="0">
-              <a:spcBef>
-                <a:spcPts val="0"/>
-              </a:spcBef>
-              <a:buNone/>
-            </a:pPr>
-            <a:r>
-              <a:rPr lang="en"/>
-              <a:t>Stated by Monge in 1781. Solved by Kantorovich in 1942.</a:t>
+            <a:pPr lvl="0" algn="ctr" rtl="0">
+              <a:spcBef>
+                <a:spcPts val="0"/>
+              </a:spcBef>
+              <a:buNone/>
+            </a:pPr>
+            <a:r>
+              <a:rPr lang="en" sz="7200" dirty="0"/>
+              <a:t>Thanks!</a:t>
             </a:r>
           </a:p>
         </p:txBody>
       </p:sp>
-      <p:pic>
-        <p:nvPicPr>
-          <p:cNvPr id="157" name="Shape 157"/>
-          <p:cNvPicPr preferRelativeResize="0"/>
+      <p:sp>
+        <p:nvSpPr>
+          <p:cNvPr id="2" name="Text Placeholder 1"/>
+          <p:cNvSpPr>
+            <a:spLocks noGrp="1"/>
+          </p:cNvSpPr>
+          <p:nvPr>
+            <p:ph type="body" idx="1"/>
+          </p:nvPr>
+        </p:nvSpPr>
+        <p:spPr>
+          <a:xfrm>
+            <a:off x="270604" y="1820297"/>
+            <a:ext cx="8520600" cy="3416400"/>
+          </a:xfrm>
+        </p:spPr>
+        <p:txBody>
+          <a:bodyPr/>
+          <a:lstStyle/>
+          <a:p>
+            <a:pPr algn="ctr"/>
+            <a:r>
+              <a:rPr lang="en-IN" sz="2400" dirty="0" smtClean="0"/>
+              <a:t>Link to the Slides</a:t>
+            </a:r>
+            <a:endParaRPr lang="en-IN" sz="2400" dirty="0"/>
+          </a:p>
+        </p:txBody>
+      </p:sp>
+      <p:sp>
+        <p:nvSpPr>
+          <p:cNvPr id="3" name="Rectangle 2"/>
+          <p:cNvSpPr/>
           <p:nvPr/>
-        </p:nvPicPr>
-        <p:blipFill>
-          <a:blip r:embed="rId3">
-            <a:alphaModFix/>
-          </a:blip>
-          <a:stretch>
-            <a:fillRect/>
-          </a:stretch>
-        </p:blipFill>
-        <p:spPr>
-          <a:xfrm>
-            <a:off x="1653075" y="1293050"/>
-            <a:ext cx="5696899" cy="3190250"/>
-          </a:xfrm>
-          <a:prstGeom prst="rect">
-            <a:avLst/>
-          </a:prstGeom>
-          <a:noFill/>
-          <a:ln>
-            <a:noFill/>
-          </a:ln>
-        </p:spPr>
-      </p:pic>
-      <p:sp>
-        <p:nvSpPr>
-          <p:cNvPr id="158" name="Shape 158"/>
-          <p:cNvSpPr txBox="1"/>
-          <p:nvPr/>
-        </p:nvSpPr>
-        <p:spPr>
-          <a:xfrm>
-            <a:off x="6828650" y="4390425"/>
-            <a:ext cx="2716500" cy="1300800"/>
-          </a:xfrm>
-          <a:prstGeom prst="rect">
-            <a:avLst/>
-          </a:prstGeom>
-          <a:noFill/>
-          <a:ln>
-            <a:noFill/>
-          </a:ln>
+        </p:nvSpPr>
+        <p:spPr>
+          <a:xfrm>
+            <a:off x="1810387" y="2999752"/>
+            <a:ext cx="5857694" cy="400110"/>
+          </a:xfrm>
+          <a:prstGeom prst="rect">
+            <a:avLst/>
+          </a:prstGeom>
         </p:spPr>
         <p:txBody>
-          <a:bodyPr lIns="91425" tIns="91425" rIns="91425" bIns="91425" anchor="ctr" anchorCtr="0">
-            <a:noAutofit/>
+          <a:bodyPr wrap="none">
+            <a:spAutoFit/>
           </a:bodyPr>
           <a:lstStyle/>
           <a:p>
-            <a:pPr lvl="0" algn="ctr" rtl="0">
-              <a:spcBef>
-                <a:spcPts val="0"/>
-              </a:spcBef>
-              <a:buNone/>
-            </a:pPr>
-            <a:r>
-              <a:rPr lang="en" sz="1000">
+            <a:r>
+              <a:rPr lang="en-IN" sz="2000" dirty="0">
                 <a:solidFill>
-                  <a:srgbClr val="222222"/>
+                  <a:srgbClr val="FF0000"/>
                 </a:solidFill>
-                <a:highlight>
-                  <a:srgbClr val="FFFFFF"/>
-                </a:highlight>
               </a:rPr>
-              <a:t>[Image: APS/</a:t>
-            </a:r>
-            <a:r>
-              <a:rPr lang="en" sz="1000">
-                <a:solidFill>
-                  <a:srgbClr val="470A68"/>
-                </a:solidFill>
-                <a:highlight>
-                  <a:srgbClr val="FFFFFF"/>
-                </a:highlight>
-                <a:hlinkClick r:id="rId4"/>
-              </a:rPr>
-              <a:t>Alan Stonebraker</a:t>
-            </a:r>
-            <a:r>
-              <a:rPr lang="en" sz="1000">
-                <a:solidFill>
-                  <a:srgbClr val="222222"/>
-                </a:solidFill>
-                <a:highlight>
-                  <a:srgbClr val="FFFFFF"/>
-                </a:highlight>
-              </a:rPr>
-              <a:t>]</a:t>
+              <a:t>https://github.com/RishabGoel/pycon_india_slides</a:t>
             </a:r>
           </a:p>
         </p:txBody>
@@ -6520,7 +6676,7 @@
   <p:cSld>
     <p:spTree>
       <p:nvGrpSpPr>
-        <p:cNvPr id="1" name="Shape 162"/>
+        <p:cNvPr id="1" name="Shape 142"/>
         <p:cNvGrpSpPr/>
         <p:nvPr/>
       </p:nvGrpSpPr>
@@ -6534,7 +6690,7 @@
       </p:grpSpPr>
       <p:sp>
         <p:nvSpPr>
-          <p:cNvPr id="163" name="Shape 163"/>
+          <p:cNvPr id="143" name="Shape 143"/>
           <p:cNvSpPr txBox="1">
             <a:spLocks noGrp="1"/>
           </p:cNvSpPr>
@@ -6544,8 +6700,8 @@
         </p:nvSpPr>
         <p:spPr>
           <a:xfrm>
-            <a:off x="-125750" y="188625"/>
-            <a:ext cx="8895300" cy="621300"/>
+            <a:off x="311708" y="744575"/>
+            <a:ext cx="8520600" cy="2052600"/>
           </a:xfrm>
           <a:prstGeom prst="rect">
             <a:avLst/>
@@ -6557,7 +6713,7 @@
           </a:bodyPr>
           <a:lstStyle/>
           <a:p>
-            <a:pPr lvl="0">
+            <a:pPr lvl="0" rtl="0">
               <a:spcBef>
                 <a:spcPts val="0"/>
               </a:spcBef>
@@ -6565,14 +6721,14 @@
             </a:pPr>
             <a:r>
               <a:rPr lang="en"/>
-              <a:t>Google’s Word2vec algorithm</a:t>
+              <a:t>Extra slides</a:t>
             </a:r>
           </a:p>
         </p:txBody>
       </p:sp>
       <p:sp>
         <p:nvSpPr>
-          <p:cNvPr id="164" name="Shape 164"/>
+          <p:cNvPr id="144" name="Shape 144"/>
           <p:cNvSpPr txBox="1">
             <a:spLocks noGrp="1"/>
           </p:cNvSpPr>
@@ -6582,7 +6738,7 @@
         </p:nvSpPr>
         <p:spPr>
           <a:xfrm>
-            <a:off x="311700" y="2414375"/>
+            <a:off x="311700" y="2834125"/>
             <a:ext cx="8520600" cy="792600"/>
           </a:xfrm>
           <a:prstGeom prst="rect">
@@ -6602,156 +6758,6 @@
               <a:buNone/>
             </a:pPr>
             <a:endParaRPr/>
-          </a:p>
-          <a:p>
-            <a:pPr lvl="0" rtl="0">
-              <a:spcBef>
-                <a:spcPts val="0"/>
-              </a:spcBef>
-              <a:buNone/>
-            </a:pPr>
-            <a:r>
-              <a:rPr lang="en"/>
-              <a:t>●</a:t>
-            </a:r>
-          </a:p>
-          <a:p>
-            <a:pPr lvl="0" rtl="0">
-              <a:spcBef>
-                <a:spcPts val="0"/>
-              </a:spcBef>
-              <a:buNone/>
-            </a:pPr>
-            <a:r>
-              <a:rPr lang="en"/>
-              <a:t>Word becomes a vector in 100-dimensional space.</a:t>
-            </a:r>
-          </a:p>
-          <a:p>
-            <a:pPr lvl="0" rtl="0">
-              <a:spcBef>
-                <a:spcPts val="0"/>
-              </a:spcBef>
-              <a:buNone/>
-            </a:pPr>
-            <a:r>
-              <a:rPr lang="en"/>
-              <a:t>● king - man + woman = queen </a:t>
-            </a:r>
-          </a:p>
-          <a:p>
-            <a:pPr lvl="0">
-              <a:spcBef>
-                <a:spcPts val="0"/>
-              </a:spcBef>
-              <a:buNone/>
-            </a:pPr>
-            <a:endParaRPr/>
-          </a:p>
-        </p:txBody>
-      </p:sp>
-      <p:pic>
-        <p:nvPicPr>
-          <p:cNvPr id="165" name="Shape 165"/>
-          <p:cNvPicPr preferRelativeResize="0"/>
-          <p:nvPr/>
-        </p:nvPicPr>
-        <p:blipFill>
-          <a:blip r:embed="rId3">
-            <a:alphaModFix/>
-          </a:blip>
-          <a:stretch>
-            <a:fillRect/>
-          </a:stretch>
-        </p:blipFill>
-        <p:spPr>
-          <a:xfrm>
-            <a:off x="1944952" y="547500"/>
-            <a:ext cx="4281874" cy="2945949"/>
-          </a:xfrm>
-          <a:prstGeom prst="rect">
-            <a:avLst/>
-          </a:prstGeom>
-          <a:noFill/>
-          <a:ln>
-            <a:noFill/>
-          </a:ln>
-        </p:spPr>
-      </p:pic>
-      <p:sp>
-        <p:nvSpPr>
-          <p:cNvPr id="166" name="Shape 166"/>
-          <p:cNvSpPr txBox="1"/>
-          <p:nvPr/>
-        </p:nvSpPr>
-        <p:spPr>
-          <a:xfrm>
-            <a:off x="228150" y="4350900"/>
-            <a:ext cx="8687700" cy="792600"/>
-          </a:xfrm>
-          <a:prstGeom prst="rect">
-            <a:avLst/>
-          </a:prstGeom>
-          <a:noFill/>
-          <a:ln>
-            <a:noFill/>
-          </a:ln>
-        </p:spPr>
-        <p:txBody>
-          <a:bodyPr lIns="91425" tIns="91425" rIns="91425" bIns="91425" anchor="ctr" anchorCtr="0">
-            <a:noAutofit/>
-          </a:bodyPr>
-          <a:lstStyle/>
-          <a:p>
-            <a:pPr lvl="0" rtl="0">
-              <a:spcBef>
-                <a:spcPts val="0"/>
-              </a:spcBef>
-              <a:buNone/>
-            </a:pPr>
-            <a:r>
-              <a:rPr lang="en" u="sng">
-                <a:solidFill>
-                  <a:schemeClr val="hlink"/>
-                </a:solidFill>
-                <a:hlinkClick r:id="rId4"/>
-              </a:rPr>
-              <a:t>http://nbviewer.jupyter.org/github/fbkarsdorp/doc2vec/blob/master/doc2vec.ipynb</a:t>
-            </a:r>
-          </a:p>
-          <a:p>
-            <a:pPr lvl="0" algn="ctr" rtl="0">
-              <a:spcBef>
-                <a:spcPts val="0"/>
-              </a:spcBef>
-              <a:buNone/>
-            </a:pPr>
-            <a:r>
-              <a:rPr lang="en" sz="2800" u="sng">
-                <a:solidFill>
-                  <a:schemeClr val="hlink"/>
-                </a:solidFill>
-                <a:hlinkClick r:id="rId5"/>
-              </a:rPr>
-              <a:t>http://radimrehurek.com/2014/02/word2vec-tutorial</a:t>
-            </a:r>
-          </a:p>
-          <a:p>
-            <a:pPr lvl="0" algn="ctr" rtl="0">
-              <a:spcBef>
-                <a:spcPts val="0"/>
-              </a:spcBef>
-              <a:buClr>
-                <a:schemeClr val="dk1"/>
-              </a:buClr>
-              <a:buFont typeface="Arial"/>
-              <a:buNone/>
-            </a:pPr>
-            <a:endParaRPr sz="2800">
-              <a:solidFill>
-                <a:schemeClr val="dk2"/>
-              </a:solidFill>
-            </a:endParaRPr>
           </a:p>
         </p:txBody>
       </p:sp>
@@ -6771,6 +6777,182 @@
 </file>
 
 <file path=ppt/slides/slide15.xml><?xml version="1.0" encoding="utf-8"?>
+<p:sld xmlns:a="http://schemas.openxmlformats.org/drawingml/2006/main" xmlns:r="http://schemas.openxmlformats.org/officeDocument/2006/relationships" xmlns:p="http://schemas.openxmlformats.org/presentationml/2006/main">
+  <p:cSld>
+    <p:spTree>
+      <p:nvGrpSpPr>
+        <p:cNvPr id="1" name="Shape 148"/>
+        <p:cNvGrpSpPr/>
+        <p:nvPr/>
+      </p:nvGrpSpPr>
+      <p:grpSpPr>
+        <a:xfrm>
+          <a:off x="0" y="0"/>
+          <a:ext cx="0" cy="0"/>
+          <a:chOff x="0" y="0"/>
+          <a:chExt cx="0" cy="0"/>
+        </a:xfrm>
+      </p:grpSpPr>
+      <p:sp>
+        <p:nvSpPr>
+          <p:cNvPr id="149" name="Shape 149"/>
+          <p:cNvSpPr txBox="1">
+            <a:spLocks noGrp="1"/>
+          </p:cNvSpPr>
+          <p:nvPr>
+            <p:ph type="ctrTitle"/>
+          </p:nvPr>
+        </p:nvSpPr>
+        <p:spPr>
+          <a:xfrm>
+            <a:off x="-17875" y="0"/>
+            <a:ext cx="9144000" cy="1112100"/>
+          </a:xfrm>
+          <a:prstGeom prst="rect">
+            <a:avLst/>
+          </a:prstGeom>
+        </p:spPr>
+        <p:txBody>
+          <a:bodyPr lIns="91425" tIns="91425" rIns="91425" bIns="91425" anchor="b" anchorCtr="0">
+            <a:noAutofit/>
+          </a:bodyPr>
+          <a:lstStyle/>
+          <a:p>
+            <a:pPr lvl="0" rtl="0">
+              <a:spcBef>
+                <a:spcPts val="0"/>
+              </a:spcBef>
+              <a:buNone/>
+            </a:pPr>
+            <a:r>
+              <a:rPr lang="en" sz="4000"/>
+              <a:t>Ways to find similar documents</a:t>
+            </a:r>
+          </a:p>
+        </p:txBody>
+      </p:sp>
+      <p:sp>
+        <p:nvSpPr>
+          <p:cNvPr id="150" name="Shape 150"/>
+          <p:cNvSpPr txBox="1">
+            <a:spLocks noGrp="1"/>
+          </p:cNvSpPr>
+          <p:nvPr>
+            <p:ph type="subTitle" idx="1"/>
+          </p:nvPr>
+        </p:nvSpPr>
+        <p:spPr>
+          <a:xfrm>
+            <a:off x="311700" y="1225275"/>
+            <a:ext cx="8520600" cy="792600"/>
+          </a:xfrm>
+          <a:prstGeom prst="rect">
+            <a:avLst/>
+          </a:prstGeom>
+        </p:spPr>
+        <p:txBody>
+          <a:bodyPr lIns="91425" tIns="91425" rIns="91425" bIns="91425" anchor="t" anchorCtr="0">
+            <a:noAutofit/>
+          </a:bodyPr>
+          <a:lstStyle/>
+          <a:p>
+            <a:pPr marL="457200" marR="0" lvl="0" indent="-406400" algn="l" rtl="0">
+              <a:lnSpc>
+                <a:spcPct val="100000"/>
+              </a:lnSpc>
+              <a:spcBef>
+                <a:spcPts val="0"/>
+              </a:spcBef>
+              <a:spcAft>
+                <a:spcPts val="0"/>
+              </a:spcAft>
+              <a:buClr>
+                <a:schemeClr val="dk2"/>
+              </a:buClr>
+              <a:buSzPct val="100000"/>
+              <a:buFont typeface="Arial"/>
+              <a:buChar char="●"/>
+            </a:pPr>
+            <a:r>
+              <a:rPr lang="en"/>
+              <a:t>Google’s Doc2vec</a:t>
+            </a:r>
+          </a:p>
+          <a:p>
+            <a:pPr marL="914400" marR="0" lvl="1" indent="-228600" algn="l" rtl="0">
+              <a:lnSpc>
+                <a:spcPct val="100000"/>
+              </a:lnSpc>
+              <a:spcBef>
+                <a:spcPts val="0"/>
+              </a:spcBef>
+              <a:spcAft>
+                <a:spcPts val="0"/>
+              </a:spcAft>
+              <a:buChar char="○"/>
+            </a:pPr>
+            <a:r>
+              <a:rPr lang="en"/>
+              <a:t>Built on top of word2vec </a:t>
+            </a:r>
+          </a:p>
+          <a:p>
+            <a:pPr marL="914400" marR="0" lvl="1" indent="-228600" algn="l" rtl="0">
+              <a:lnSpc>
+                <a:spcPct val="100000"/>
+              </a:lnSpc>
+              <a:spcBef>
+                <a:spcPts val="0"/>
+              </a:spcBef>
+              <a:spcAft>
+                <a:spcPts val="0"/>
+              </a:spcAft>
+              <a:buChar char="○"/>
+            </a:pPr>
+            <a:r>
+              <a:rPr lang="en"/>
+              <a:t>Document tags are just extra words in the document</a:t>
+            </a:r>
+          </a:p>
+          <a:p>
+            <a:pPr marL="0" lvl="0" indent="0" algn="l" rtl="0">
+              <a:spcBef>
+                <a:spcPts val="0"/>
+              </a:spcBef>
+              <a:buNone/>
+            </a:pPr>
+            <a:endParaRPr/>
+          </a:p>
+          <a:p>
+            <a:pPr marL="0" lvl="0" indent="0" algn="l" rtl="0">
+              <a:spcBef>
+                <a:spcPts val="0"/>
+              </a:spcBef>
+              <a:buNone/>
+            </a:pPr>
+            <a:r>
+              <a:rPr lang="en" i="1"/>
+              <a:t>Hard to tune. Slow inference.</a:t>
+            </a:r>
+          </a:p>
+        </p:txBody>
+      </p:sp>
+    </p:spTree>
+  </p:cSld>
+  <p:clrMapOvr>
+    <a:masterClrMapping/>
+  </p:clrMapOvr>
+  <p:timing>
+    <p:tnLst>
+      <p:par>
+        <p:cTn id="1" dur="indefinite" restart="never" nodeType="tmRoot"/>
+      </p:par>
+    </p:tnLst>
+  </p:timing>
+</p:sld>
+</file>
+
+<file path=ppt/slides/slide16.xml><?xml version="1.0" encoding="utf-8"?>
 <p:sld xmlns:a="http://schemas.openxmlformats.org/drawingml/2006/main" xmlns:r="http://schemas.openxmlformats.org/officeDocument/2006/relationships" xmlns:p="http://schemas.openxmlformats.org/presentationml/2006/main">
   <p:cSld>
     <p:spTree>
@@ -7205,7 +7387,14 @@
               <a:buChar char="●"/>
             </a:pPr>
             <a:r>
-              <a:rPr lang="en"/>
+              <a:rPr lang="en" dirty="0">
+                <a:solidFill>
+                  <a:schemeClr val="tx1">
+                    <a:lumMod val="95000"/>
+                    <a:lumOff val="5000"/>
+                  </a:schemeClr>
+                </a:solidFill>
+              </a:rPr>
               <a:t>Count common words ( bag of words, TF-IDF)</a:t>
             </a:r>
           </a:p>
@@ -7217,7 +7406,14 @@
               <a:buChar char="○"/>
             </a:pPr>
             <a:r>
-              <a:rPr lang="en"/>
+              <a:rPr lang="en" dirty="0">
+                <a:solidFill>
+                  <a:schemeClr val="tx1">
+                    <a:lumMod val="95000"/>
+                    <a:lumOff val="5000"/>
+                  </a:schemeClr>
+                </a:solidFill>
+              </a:rPr>
               <a:t>#Dimensions = #Vocabulary (thousands)</a:t>
             </a:r>
           </a:p>
@@ -7228,7 +7424,14 @@
               </a:spcBef>
               <a:buNone/>
             </a:pPr>
-            <a:endParaRPr i="1"/>
+            <a:endParaRPr i="1" dirty="0">
+              <a:solidFill>
+                <a:schemeClr val="tx1">
+                  <a:lumMod val="95000"/>
+                  <a:lumOff val="5000"/>
+                </a:schemeClr>
+              </a:solidFill>
+            </a:endParaRPr>
           </a:p>
           <a:p>
             <a:pPr marL="0" lvl="0" indent="0" algn="l" rtl="0">
@@ -7238,7 +7441,14 @@
               <a:buNone/>
             </a:pPr>
             <a:r>
-              <a:rPr lang="en" i="1"/>
+              <a:rPr lang="en" i="1" dirty="0">
+                <a:solidFill>
+                  <a:schemeClr val="tx1">
+                    <a:lumMod val="95000"/>
+                    <a:lumOff val="5000"/>
+                  </a:schemeClr>
+                </a:solidFill>
+              </a:rPr>
               <a:t>Stuck if no words in common.</a:t>
             </a:r>
           </a:p>
@@ -7250,7 +7460,14 @@
               <a:buNone/>
             </a:pPr>
             <a:r>
-              <a:rPr lang="en" i="1"/>
+              <a:rPr lang="en" i="1" dirty="0">
+                <a:solidFill>
+                  <a:schemeClr val="tx1">
+                    <a:lumMod val="95000"/>
+                    <a:lumOff val="5000"/>
+                  </a:schemeClr>
+                </a:solidFill>
+              </a:rPr>
               <a:t>“Gelato” != “Ice-cream”</a:t>
             </a:r>
           </a:p>
@@ -7261,7 +7478,14 @@
               </a:spcBef>
               <a:buNone/>
             </a:pPr>
-            <a:endParaRPr/>
+            <a:endParaRPr dirty="0">
+              <a:solidFill>
+                <a:schemeClr val="tx1">
+                  <a:lumMod val="95000"/>
+                  <a:lumOff val="5000"/>
+                </a:schemeClr>
+              </a:solidFill>
+            </a:endParaRPr>
           </a:p>
         </p:txBody>
       </p:sp>
@@ -7273,7 +7497,7 @@
         </p:nvSpPr>
         <p:spPr>
           <a:xfrm>
-            <a:off x="560865" y="4524075"/>
+            <a:off x="192735" y="4524075"/>
             <a:ext cx="8003969" cy="523220"/>
           </a:xfrm>
           <a:prstGeom prst="rect">
@@ -7303,9 +7527,12 @@
           </a:p>
           <a:p>
             <a:r>
-              <a:rPr lang="en-IN" dirty="0"/>
+              <a:rPr lang="en-IN" dirty="0">
+                <a:hlinkClick r:id="rId3"/>
+              </a:rPr>
               <a:t>https://speakerdeck.com/tmylk/same-content-different-words</a:t>
             </a:r>
+            <a:endParaRPr lang="en-IN" dirty="0"/>
           </a:p>
         </p:txBody>
       </p:sp>
@@ -7411,11 +7638,25 @@
               <a:buChar char="●"/>
             </a:pPr>
             <a:r>
-              <a:rPr lang="en" dirty="0" smtClean="0"/>
+              <a:rPr lang="en" dirty="0" smtClean="0">
+                <a:solidFill>
+                  <a:schemeClr val="tx1">
+                    <a:lumMod val="95000"/>
+                    <a:lumOff val="5000"/>
+                  </a:schemeClr>
+                </a:solidFill>
+              </a:rPr>
               <a:t>Low-dimensional </a:t>
             </a:r>
             <a:r>
-              <a:rPr lang="en" dirty="0"/>
+              <a:rPr lang="en" dirty="0">
+                <a:solidFill>
+                  <a:schemeClr val="tx1">
+                    <a:lumMod val="95000"/>
+                    <a:lumOff val="5000"/>
+                  </a:schemeClr>
+                </a:solidFill>
+              </a:rPr>
               <a:t>latent features</a:t>
             </a:r>
           </a:p>
@@ -7427,7 +7668,14 @@
               <a:buChar char="○"/>
             </a:pPr>
             <a:r>
-              <a:rPr lang="en" dirty="0"/>
+              <a:rPr lang="en" dirty="0">
+                <a:solidFill>
+                  <a:schemeClr val="tx1">
+                    <a:lumMod val="95000"/>
+                    <a:lumOff val="5000"/>
+                  </a:schemeClr>
+                </a:solidFill>
+              </a:rPr>
               <a:t>Eigen-values (LSI)</a:t>
             </a:r>
           </a:p>
@@ -7439,7 +7687,14 @@
               <a:buChar char="○"/>
             </a:pPr>
             <a:r>
-              <a:rPr lang="en" dirty="0"/>
+              <a:rPr lang="en" dirty="0">
+                <a:solidFill>
+                  <a:schemeClr val="tx1">
+                    <a:lumMod val="95000"/>
+                    <a:lumOff val="5000"/>
+                  </a:schemeClr>
+                </a:solidFill>
+              </a:rPr>
               <a:t>Probability (LDA)</a:t>
             </a:r>
           </a:p>
@@ -7450,20 +7705,48 @@
               </a:spcBef>
               <a:buNone/>
             </a:pPr>
-            <a:endParaRPr dirty="0"/>
+            <a:endParaRPr dirty="0">
+              <a:solidFill>
+                <a:schemeClr val="tx1">
+                  <a:lumMod val="95000"/>
+                  <a:lumOff val="5000"/>
+                </a:schemeClr>
+              </a:solidFill>
+            </a:endParaRPr>
           </a:p>
           <a:p>
             <a:pPr lvl="0" algn="l"/>
             <a:r>
-              <a:rPr lang="en" i="1" dirty="0" smtClean="0"/>
+              <a:rPr lang="en" i="1" dirty="0" smtClean="0">
+                <a:solidFill>
+                  <a:schemeClr val="tx1">
+                    <a:lumMod val="95000"/>
+                    <a:lumOff val="5000"/>
+                  </a:schemeClr>
+                </a:solidFill>
+              </a:rPr>
               <a:t>Good </a:t>
             </a:r>
             <a:r>
-              <a:rPr lang="en" i="1" dirty="0"/>
+              <a:rPr lang="en" i="1" dirty="0">
+                <a:solidFill>
+                  <a:schemeClr val="tx1">
+                    <a:lumMod val="95000"/>
+                    <a:lumOff val="5000"/>
+                  </a:schemeClr>
+                </a:solidFill>
+              </a:rPr>
               <a:t>representation </a:t>
             </a:r>
             <a:r>
-              <a:rPr lang="en" i="1" dirty="0" smtClean="0"/>
+              <a:rPr lang="en" i="1" dirty="0" smtClean="0">
+                <a:solidFill>
+                  <a:schemeClr val="tx1">
+                    <a:lumMod val="95000"/>
+                    <a:lumOff val="5000"/>
+                  </a:schemeClr>
+                </a:solidFill>
+              </a:rPr>
               <a:t>But …</a:t>
             </a:r>
           </a:p>
@@ -7475,15 +7758,36 @@
               <a:buNone/>
             </a:pPr>
             <a:r>
-              <a:rPr lang="en" i="1" dirty="0"/>
+              <a:rPr lang="en" i="1" dirty="0">
+                <a:solidFill>
+                  <a:schemeClr val="tx1">
+                    <a:lumMod val="95000"/>
+                    <a:lumOff val="5000"/>
+                  </a:schemeClr>
+                </a:solidFill>
+              </a:rPr>
               <a:t>T</a:t>
             </a:r>
             <a:r>
-              <a:rPr lang="en" i="1" dirty="0" smtClean="0"/>
+              <a:rPr lang="en" i="1" dirty="0" smtClean="0">
+                <a:solidFill>
+                  <a:schemeClr val="tx1">
+                    <a:lumMod val="95000"/>
+                    <a:lumOff val="5000"/>
+                  </a:schemeClr>
+                </a:solidFill>
+              </a:rPr>
               <a:t>here </a:t>
             </a:r>
             <a:r>
-              <a:rPr lang="en" i="1" dirty="0"/>
+              <a:rPr lang="en" i="1" dirty="0">
+                <a:solidFill>
+                  <a:schemeClr val="tx1">
+                    <a:lumMod val="95000"/>
+                    <a:lumOff val="5000"/>
+                  </a:schemeClr>
+                </a:solidFill>
+              </a:rPr>
               <a:t>is something better now… WMD!</a:t>
             </a:r>
           </a:p>
@@ -7497,7 +7801,7 @@
         </p:nvSpPr>
         <p:spPr>
           <a:xfrm>
-            <a:off x="1736766" y="4487963"/>
+            <a:off x="-20788" y="4559213"/>
             <a:ext cx="5670467" cy="523220"/>
           </a:xfrm>
           <a:prstGeom prst="rect">
@@ -7522,7 +7826,9 @@
           </a:p>
           <a:p>
             <a:r>
-              <a:rPr lang="en-IN" dirty="0"/>
+              <a:rPr lang="en-IN" dirty="0">
+                <a:hlinkClick r:id="rId3"/>
+              </a:rPr>
               <a:t>https://speakerdeck.com/tmylk/same-content-different-words</a:t>
             </a:r>
             <a:endParaRPr lang="en-IN" dirty="0"/>
@@ -7646,7 +7952,14 @@
               <a:buChar char="●"/>
             </a:pPr>
             <a:r>
-              <a:rPr lang="en" dirty="0"/>
+              <a:rPr lang="en" dirty="0">
+                <a:solidFill>
+                  <a:schemeClr val="tx1">
+                    <a:lumMod val="95000"/>
+                    <a:lumOff val="5000"/>
+                  </a:schemeClr>
+                </a:solidFill>
+              </a:rPr>
               <a:t>Word Mover’s Distance</a:t>
             </a:r>
           </a:p>
@@ -7664,7 +7977,14 @@
               <a:buChar char="○"/>
             </a:pPr>
             <a:r>
-              <a:rPr lang="en" dirty="0"/>
+              <a:rPr lang="en" dirty="0">
+                <a:solidFill>
+                  <a:schemeClr val="tx1">
+                    <a:lumMod val="95000"/>
+                    <a:lumOff val="5000"/>
+                  </a:schemeClr>
+                </a:solidFill>
+              </a:rPr>
               <a:t>Built on top of Google’s word2vec </a:t>
             </a:r>
           </a:p>
@@ -7682,7 +8002,14 @@
               <a:buChar char="○"/>
             </a:pPr>
             <a:r>
-              <a:rPr lang="en" dirty="0"/>
+              <a:rPr lang="en" dirty="0">
+                <a:solidFill>
+                  <a:schemeClr val="tx1">
+                    <a:lumMod val="95000"/>
+                    <a:lumOff val="5000"/>
+                  </a:schemeClr>
+                </a:solidFill>
+              </a:rPr>
               <a:t>Well-used concept in other fields known as Earth Mover’s Distance</a:t>
             </a:r>
           </a:p>
@@ -7693,7 +8020,14 @@
               </a:spcBef>
               <a:buNone/>
             </a:pPr>
-            <a:endParaRPr dirty="0"/>
+            <a:endParaRPr dirty="0">
+              <a:solidFill>
+                <a:schemeClr val="tx1">
+                  <a:lumMod val="95000"/>
+                  <a:lumOff val="5000"/>
+                </a:schemeClr>
+              </a:solidFill>
+            </a:endParaRPr>
           </a:p>
           <a:p>
             <a:pPr marL="0" lvl="0" indent="0" algn="l" rtl="0">
@@ -7703,23 +8037,58 @@
               <a:buNone/>
             </a:pPr>
             <a:r>
-              <a:rPr lang="en" i="1" dirty="0"/>
+              <a:rPr lang="en" i="1" dirty="0">
+                <a:solidFill>
+                  <a:schemeClr val="tx1">
+                    <a:lumMod val="95000"/>
+                    <a:lumOff val="5000"/>
+                  </a:schemeClr>
+                </a:solidFill>
+              </a:rPr>
               <a:t>Beats BOW, TF-IDF, LDA, LSI </a:t>
             </a:r>
             <a:r>
-              <a:rPr lang="en" i="1" dirty="0" smtClean="0"/>
+              <a:rPr lang="en" i="1" dirty="0" smtClean="0">
+                <a:solidFill>
+                  <a:schemeClr val="tx1">
+                    <a:lumMod val="95000"/>
+                    <a:lumOff val="5000"/>
+                  </a:schemeClr>
+                </a:solidFill>
+              </a:rPr>
               <a:t>in </a:t>
             </a:r>
             <a:r>
-              <a:rPr lang="en" i="1" dirty="0"/>
+              <a:rPr lang="en" i="1" dirty="0">
+                <a:solidFill>
+                  <a:schemeClr val="tx1">
+                    <a:lumMod val="95000"/>
+                    <a:lumOff val="5000"/>
+                  </a:schemeClr>
+                </a:solidFill>
+              </a:rPr>
               <a:t>Nearest Neigbours </a:t>
             </a:r>
             <a:r>
-              <a:rPr lang="en" i="1" dirty="0" smtClean="0"/>
+              <a:rPr lang="en" i="1" dirty="0" smtClean="0">
+                <a:solidFill>
+                  <a:schemeClr val="tx1">
+                    <a:lumMod val="95000"/>
+                    <a:lumOff val="5000"/>
+                  </a:schemeClr>
+                </a:solidFill>
+              </a:rPr>
               <a:t>document classification </a:t>
             </a:r>
             <a:r>
-              <a:rPr lang="en" i="1" dirty="0"/>
+              <a:rPr lang="en" i="1" dirty="0">
+                <a:solidFill>
+                  <a:schemeClr val="tx1">
+                    <a:lumMod val="95000"/>
+                    <a:lumOff val="5000"/>
+                  </a:schemeClr>
+                </a:solidFill>
+              </a:rPr>
               <a:t>tasks.</a:t>
             </a:r>
           </a:p>
@@ -7733,7 +8102,7 @@
         </p:nvSpPr>
         <p:spPr>
           <a:xfrm>
-            <a:off x="1561604" y="4601233"/>
+            <a:off x="5934" y="4601233"/>
             <a:ext cx="5753595" cy="523220"/>
           </a:xfrm>
           <a:prstGeom prst="rect">
@@ -7758,7 +8127,9 @@
           </a:p>
           <a:p>
             <a:r>
-              <a:rPr lang="en-IN" dirty="0"/>
+              <a:rPr lang="en-IN" dirty="0">
+                <a:hlinkClick r:id="rId3"/>
+              </a:rPr>
               <a:t>https://speakerdeck.com/tmylk/same-content-different-words</a:t>
             </a:r>
             <a:endParaRPr lang="en-IN" dirty="0"/>
@@ -7785,7 +8156,7 @@
   <p:cSld>
     <p:spTree>
       <p:nvGrpSpPr>
-        <p:cNvPr id="1" name="Shape 106"/>
+        <p:cNvPr id="1" name="Shape 154"/>
         <p:cNvGrpSpPr/>
         <p:nvPr/>
       </p:nvGrpSpPr>
@@ -7799,7 +8170,7 @@
       </p:grpSpPr>
       <p:sp>
         <p:nvSpPr>
-          <p:cNvPr id="107" name="Shape 107"/>
+          <p:cNvPr id="155" name="Shape 155"/>
           <p:cNvSpPr txBox="1">
             <a:spLocks noGrp="1"/>
           </p:cNvSpPr>
@@ -7809,8 +8180,8 @@
         </p:nvSpPr>
         <p:spPr>
           <a:xfrm>
-            <a:off x="8" y="-1055625"/>
-            <a:ext cx="8520600" cy="2052600"/>
+            <a:off x="0" y="69025"/>
+            <a:ext cx="8832300" cy="1300800"/>
           </a:xfrm>
           <a:prstGeom prst="rect">
             <a:avLst/>
@@ -7829,15 +8200,72 @@
               <a:buNone/>
             </a:pPr>
             <a:r>
-              <a:rPr lang="en"/>
-              <a:t>Word Mover’s distance </a:t>
+              <a:rPr lang="en" sz="4000"/>
+              <a:t>Earth Mover’s Distance</a:t>
+            </a:r>
+          </a:p>
+          <a:p>
+            <a:pPr lvl="0">
+              <a:spcBef>
+                <a:spcPts val="0"/>
+              </a:spcBef>
+              <a:buNone/>
+            </a:pPr>
+            <a:r>
+              <a:rPr lang="en" sz="2200">
+                <a:solidFill>
+                  <a:srgbClr val="222222"/>
+                </a:solidFill>
+                <a:highlight>
+                  <a:srgbClr val="FFFFFF"/>
+                </a:highlight>
+              </a:rPr>
+              <a:t>How do you best move piles of sand to fill up holes of the same total volume? </a:t>
+            </a:r>
+          </a:p>
+        </p:txBody>
+      </p:sp>
+      <p:sp>
+        <p:nvSpPr>
+          <p:cNvPr id="156" name="Shape 156"/>
+          <p:cNvSpPr txBox="1">
+            <a:spLocks noGrp="1"/>
+          </p:cNvSpPr>
+          <p:nvPr>
+            <p:ph type="subTitle" idx="1"/>
+          </p:nvPr>
+        </p:nvSpPr>
+        <p:spPr>
+          <a:xfrm>
+            <a:off x="178125" y="4602050"/>
+            <a:ext cx="9144000" cy="936600"/>
+          </a:xfrm>
+          <a:prstGeom prst="rect">
+            <a:avLst/>
+          </a:prstGeom>
+        </p:spPr>
+        <p:txBody>
+          <a:bodyPr lIns="91425" tIns="91425" rIns="91425" bIns="91425" anchor="t" anchorCtr="0">
+            <a:noAutofit/>
+          </a:bodyPr>
+          <a:lstStyle/>
+          <a:p>
+            <a:pPr lvl="0" algn="l" rtl="0">
+              <a:spcBef>
+                <a:spcPts val="0"/>
+              </a:spcBef>
+              <a:buNone/>
+            </a:pPr>
+            <a:r>
+              <a:rPr lang="en" sz="2000" dirty="0"/>
+              <a:t>Stated by Monge in 1781. Solved by Kantorovich in 1942.</a:t>
             </a:r>
           </a:p>
         </p:txBody>
       </p:sp>
       <p:pic>
         <p:nvPicPr>
-          <p:cNvPr id="108" name="Shape 108"/>
+          <p:cNvPr id="157" name="Shape 157"/>
           <p:cNvPicPr preferRelativeResize="0"/>
           <p:nvPr/>
         </p:nvPicPr>
@@ -7851,8 +8279,8 @@
         </p:blipFill>
         <p:spPr>
           <a:xfrm>
-            <a:off x="888851" y="783199"/>
-            <a:ext cx="6742900" cy="4017250"/>
+            <a:off x="1653075" y="1293050"/>
+            <a:ext cx="5696899" cy="3190250"/>
           </a:xfrm>
           <a:prstGeom prst="rect">
             <a:avLst/>
@@ -7865,21 +8293,19 @@
       </p:pic>
       <p:sp>
         <p:nvSpPr>
-          <p:cNvPr id="109" name="Shape 109"/>
+          <p:cNvPr id="158" name="Shape 158"/>
           <p:cNvSpPr txBox="1"/>
           <p:nvPr/>
         </p:nvSpPr>
         <p:spPr>
           <a:xfrm>
-            <a:off x="176050" y="3973950"/>
-            <a:ext cx="8802900" cy="1169400"/>
-          </a:xfrm>
-          <a:prstGeom prst="rect">
-            <a:avLst/>
-          </a:prstGeom>
-          <a:solidFill>
-            <a:schemeClr val="lt1"/>
-          </a:solidFill>
+            <a:off x="6828650" y="4390425"/>
+            <a:ext cx="2716500" cy="1300800"/>
+          </a:xfrm>
+          <a:prstGeom prst="rect">
+            <a:avLst/>
+          </a:prstGeom>
+          <a:noFill/>
           <a:ln>
             <a:noFill/>
           </a:ln>
@@ -7890,47 +8316,46 @@
           </a:bodyPr>
           <a:lstStyle/>
           <a:p>
-            <a:pPr lvl="0" rtl="0">
-              <a:spcBef>
-                <a:spcPts val="0"/>
-              </a:spcBef>
-              <a:buNone/>
-            </a:pPr>
-            <a:r>
-              <a:rPr lang="en" u="sng" dirty="0">
+            <a:pPr lvl="0" algn="ctr" rtl="0">
+              <a:spcBef>
+                <a:spcPts val="0"/>
+              </a:spcBef>
+              <a:buNone/>
+            </a:pPr>
+            <a:r>
+              <a:rPr lang="en" sz="1000">
                 <a:solidFill>
-                  <a:schemeClr val="hlink"/>
+                  <a:srgbClr val="222222"/>
                 </a:solidFill>
+                <a:highlight>
+                  <a:srgbClr val="FFFFFF"/>
+                </a:highlight>
+              </a:rPr>
+              <a:t>[Image: APS/</a:t>
+            </a:r>
+            <a:r>
+              <a:rPr lang="en" sz="1000">
+                <a:solidFill>
+                  <a:srgbClr val="470A68"/>
+                </a:solidFill>
+                <a:highlight>
+                  <a:srgbClr val="FFFFFF"/>
+                </a:highlight>
                 <a:hlinkClick r:id="rId4"/>
               </a:rPr>
-              <a:t>http://jmlr.org/proceedings/papers/v37/kusnerb15.pdf</a:t>
-            </a:r>
-          </a:p>
-          <a:p>
-            <a:pPr lvl="0" rtl="0">
-              <a:spcBef>
-                <a:spcPts val="0"/>
-              </a:spcBef>
-              <a:buNone/>
-            </a:pPr>
-            <a:r>
-              <a:rPr lang="en" u="sng" dirty="0">
+              <a:t>Alan Stonebraker</a:t>
+            </a:r>
+            <a:r>
+              <a:rPr lang="en" sz="1000">
                 <a:solidFill>
-                  <a:schemeClr val="hlink"/>
+                  <a:srgbClr val="222222"/>
                 </a:solidFill>
-                <a:hlinkClick r:id="rId5"/>
+                <a:highlight>
+                  <a:srgbClr val="FFFFFF"/>
+                </a:highlight>
               </a:rPr>
-              <a:t>https://github.com/mkusner/wmd</a:t>
-            </a:r>
-          </a:p>
-          <a:p>
-            <a:pPr lvl="0" rtl="0">
-              <a:spcBef>
-                <a:spcPts val="0"/>
-              </a:spcBef>
-              <a:buNone/>
-            </a:pPr>
-            <a:endParaRPr dirty="0"/>
+              <a:t>]</a:t>
+            </a:r>
           </a:p>
         </p:txBody>
       </p:sp>
@@ -7954,7 +8379,7 @@
   <p:cSld>
     <p:spTree>
       <p:nvGrpSpPr>
-        <p:cNvPr id="1" name="Shape 113"/>
+        <p:cNvPr id="1" name="Shape 162"/>
         <p:cNvGrpSpPr/>
         <p:nvPr/>
       </p:nvGrpSpPr>
@@ -7968,7 +8393,7 @@
       </p:grpSpPr>
       <p:sp>
         <p:nvSpPr>
-          <p:cNvPr id="114" name="Shape 114"/>
+          <p:cNvPr id="163" name="Shape 163"/>
           <p:cNvSpPr txBox="1">
             <a:spLocks noGrp="1"/>
           </p:cNvSpPr>
@@ -7978,8 +8403,8 @@
         </p:nvSpPr>
         <p:spPr>
           <a:xfrm>
-            <a:off x="8" y="-1055625"/>
-            <a:ext cx="8520600" cy="2052600"/>
+            <a:off x="-125750" y="188625"/>
+            <a:ext cx="8895300" cy="621300"/>
           </a:xfrm>
           <a:prstGeom prst="rect">
             <a:avLst/>
@@ -7999,14 +8424,94 @@
             </a:pPr>
             <a:r>
               <a:rPr lang="en"/>
-              <a:t>Word Mover’s distance </a:t>
-            </a:r>
+              <a:t>Google’s Word2vec algorithm</a:t>
+            </a:r>
+          </a:p>
+        </p:txBody>
+      </p:sp>
+      <p:sp>
+        <p:nvSpPr>
+          <p:cNvPr id="164" name="Shape 164"/>
+          <p:cNvSpPr txBox="1">
+            <a:spLocks noGrp="1"/>
+          </p:cNvSpPr>
+          <p:nvPr>
+            <p:ph type="subTitle" idx="1"/>
+          </p:nvPr>
+        </p:nvSpPr>
+        <p:spPr>
+          <a:xfrm>
+            <a:off x="311700" y="2414375"/>
+            <a:ext cx="8520600" cy="792600"/>
+          </a:xfrm>
+          <a:prstGeom prst="rect">
+            <a:avLst/>
+          </a:prstGeom>
+        </p:spPr>
+        <p:txBody>
+          <a:bodyPr lIns="91425" tIns="91425" rIns="91425" bIns="91425" anchor="t" anchorCtr="0">
+            <a:noAutofit/>
+          </a:bodyPr>
+          <a:lstStyle/>
+          <a:p>
+            <a:pPr lvl="0" rtl="0">
+              <a:spcBef>
+                <a:spcPts val="0"/>
+              </a:spcBef>
+              <a:buNone/>
+            </a:pPr>
+            <a:endParaRPr/>
+          </a:p>
+          <a:p>
+            <a:pPr lvl="0" rtl="0">
+              <a:spcBef>
+                <a:spcPts val="0"/>
+              </a:spcBef>
+              <a:buNone/>
+            </a:pPr>
+            <a:r>
+              <a:rPr lang="en"/>
+              <a:t>●</a:t>
+            </a:r>
+          </a:p>
+          <a:p>
+            <a:pPr lvl="0" rtl="0">
+              <a:spcBef>
+                <a:spcPts val="0"/>
+              </a:spcBef>
+              <a:buNone/>
+            </a:pPr>
+            <a:r>
+              <a:rPr lang="en"/>
+              <a:t>Word becomes a vector in 100-dimensional space.</a:t>
+            </a:r>
+          </a:p>
+          <a:p>
+            <a:pPr lvl="0" rtl="0">
+              <a:spcBef>
+                <a:spcPts val="0"/>
+              </a:spcBef>
+              <a:buNone/>
+            </a:pPr>
+            <a:r>
+              <a:rPr lang="en"/>
+              <a:t>● king - man + woman = queen </a:t>
+            </a:r>
+          </a:p>
+          <a:p>
+            <a:pPr lvl="0">
+              <a:spcBef>
+                <a:spcPts val="0"/>
+              </a:spcBef>
+              <a:buNone/>
+            </a:pPr>
+            <a:endParaRPr/>
           </a:p>
         </p:txBody>
       </p:sp>
       <p:pic>
         <p:nvPicPr>
-          <p:cNvPr id="115" name="Shape 115"/>
+          <p:cNvPr id="165" name="Shape 165"/>
           <p:cNvPicPr preferRelativeResize="0"/>
           <p:nvPr/>
         </p:nvPicPr>
@@ -8020,8 +8525,8 @@
         </p:blipFill>
         <p:spPr>
           <a:xfrm>
-            <a:off x="3893903" y="1263721"/>
-            <a:ext cx="4821911" cy="3099178"/>
+            <a:off x="1944952" y="547500"/>
+            <a:ext cx="4281874" cy="2945949"/>
           </a:xfrm>
           <a:prstGeom prst="rect">
             <a:avLst/>
@@ -8034,14 +8539,14 @@
       </p:pic>
       <p:sp>
         <p:nvSpPr>
-          <p:cNvPr id="116" name="Shape 116"/>
+          <p:cNvPr id="166" name="Shape 166"/>
           <p:cNvSpPr txBox="1"/>
           <p:nvPr/>
         </p:nvSpPr>
         <p:spPr>
           <a:xfrm>
-            <a:off x="156570" y="3814014"/>
-            <a:ext cx="8727600" cy="1760700"/>
+            <a:off x="228150" y="4350900"/>
+            <a:ext cx="8687700" cy="792600"/>
           </a:xfrm>
           <a:prstGeom prst="rect">
             <a:avLst/>
@@ -8058,77 +8563,54 @@
           <a:lstStyle/>
           <a:p>
             <a:pPr lvl="0" rtl="0">
-              <a:lnSpc>
-                <a:spcPct val="115000"/>
-              </a:lnSpc>
-              <a:spcBef>
-                <a:spcPts val="0"/>
-              </a:spcBef>
-              <a:buNone/>
-            </a:pPr>
-            <a:r>
-              <a:rPr lang="en" u="sng" dirty="0">
+              <a:spcBef>
+                <a:spcPts val="0"/>
+              </a:spcBef>
+              <a:buNone/>
+            </a:pPr>
+            <a:r>
+              <a:rPr lang="en" u="sng">
                 <a:solidFill>
                   <a:schemeClr val="hlink"/>
                 </a:solidFill>
                 <a:hlinkClick r:id="rId4"/>
               </a:rPr>
-              <a:t>http://tech.opentable.com/2015/08/11/navigating-themes-in-restaurant-reviews-with-word-movers-distance/</a:t>
-            </a:r>
-          </a:p>
-        </p:txBody>
-      </p:sp>
-      <p:pic>
-        <p:nvPicPr>
-          <p:cNvPr id="2" name="Picture 1"/>
-          <p:cNvPicPr>
-            <a:picLocks noChangeAspect="1"/>
-          </p:cNvPicPr>
-          <p:nvPr/>
-        </p:nvPicPr>
-        <p:blipFill>
-          <a:blip r:embed="rId5"/>
-          <a:stretch>
-            <a:fillRect/>
-          </a:stretch>
-        </p:blipFill>
-        <p:spPr>
-          <a:xfrm>
-            <a:off x="156570" y="1518854"/>
-            <a:ext cx="3273207" cy="1773281"/>
-          </a:xfrm>
-          <a:prstGeom prst="rect">
-            <a:avLst/>
-          </a:prstGeom>
-        </p:spPr>
-      </p:pic>
-      <p:sp>
-        <p:nvSpPr>
-          <p:cNvPr id="3" name="TextBox 2"/>
-          <p:cNvSpPr txBox="1"/>
-          <p:nvPr/>
-        </p:nvSpPr>
-        <p:spPr>
-          <a:xfrm>
-            <a:off x="581889" y="3521268"/>
-            <a:ext cx="2945081" cy="369332"/>
-          </a:xfrm>
-          <a:prstGeom prst="rect">
-            <a:avLst/>
-          </a:prstGeom>
-          <a:noFill/>
-        </p:spPr>
-        <p:txBody>
-          <a:bodyPr wrap="square" rtlCol="0">
-            <a:spAutoFit/>
-          </a:bodyPr>
-          <a:lstStyle/>
-          <a:p>
-            <a:r>
-              <a:rPr lang="en-IN" sz="1800" dirty="0" smtClean="0"/>
-              <a:t>Optimization Expression</a:t>
-            </a:r>
-            <a:endParaRPr lang="en-IN" sz="1800" dirty="0"/>
+              <a:t>http://nbviewer.jupyter.org/github/fbkarsdorp/doc2vec/blob/master/doc2vec.ipynb</a:t>
+            </a:r>
+          </a:p>
+          <a:p>
+            <a:pPr lvl="0" algn="ctr" rtl="0">
+              <a:spcBef>
+                <a:spcPts val="0"/>
+              </a:spcBef>
+              <a:buNone/>
+            </a:pPr>
+            <a:r>
+              <a:rPr lang="en" sz="2800" u="sng">
+                <a:solidFill>
+                  <a:schemeClr val="hlink"/>
+                </a:solidFill>
+                <a:hlinkClick r:id="rId5"/>
+              </a:rPr>
+              <a:t>http://radimrehurek.com/2014/02/word2vec-tutorial</a:t>
+            </a:r>
+          </a:p>
+          <a:p>
+            <a:pPr lvl="0" algn="ctr" rtl="0">
+              <a:spcBef>
+                <a:spcPts val="0"/>
+              </a:spcBef>
+              <a:buClr>
+                <a:schemeClr val="dk1"/>
+              </a:buClr>
+              <a:buFont typeface="Arial"/>
+              <a:buNone/>
+            </a:pPr>
+            <a:endParaRPr sz="2800">
+              <a:solidFill>
+                <a:schemeClr val="dk2"/>
+              </a:solidFill>
+            </a:endParaRPr>
           </a:p>
         </p:txBody>
       </p:sp>
@@ -8152,7 +8634,7 @@
   <p:cSld>
     <p:spTree>
       <p:nvGrpSpPr>
-        <p:cNvPr id="1" name=""/>
+        <p:cNvPr id="1" name="Shape 106"/>
         <p:cNvGrpSpPr/>
         <p:nvPr/>
       </p:nvGrpSpPr>
@@ -8166,118 +8648,120 @@
       </p:grpSpPr>
       <p:sp>
         <p:nvSpPr>
-          <p:cNvPr id="2" name="Title 1"/>
-          <p:cNvSpPr>
+          <p:cNvPr id="107" name="Shape 107"/>
+          <p:cNvSpPr txBox="1">
             <a:spLocks noGrp="1"/>
           </p:cNvSpPr>
           <p:nvPr>
-            <p:ph type="title"/>
+            <p:ph type="ctrTitle"/>
           </p:nvPr>
         </p:nvSpPr>
         <p:spPr>
           <a:xfrm>
-            <a:off x="311700" y="298298"/>
-            <a:ext cx="8520600" cy="1445105"/>
-          </a:xfrm>
+            <a:off x="8" y="-1055625"/>
+            <a:ext cx="8520600" cy="2052600"/>
+          </a:xfrm>
+          <a:prstGeom prst="rect">
+            <a:avLst/>
+          </a:prstGeom>
         </p:spPr>
         <p:txBody>
-          <a:bodyPr/>
+          <a:bodyPr lIns="91425" tIns="91425" rIns="91425" bIns="91425" anchor="b" anchorCtr="0">
+            <a:noAutofit/>
+          </a:bodyPr>
           <a:lstStyle/>
           <a:p>
-            <a:pPr algn="l"/>
-            <a:r>
-              <a:rPr lang="en-IN" sz="2400" dirty="0" smtClean="0"/>
-              <a:t>Word Centroid Distance is a </a:t>
-            </a:r>
-            <a:r>
-              <a:rPr lang="en-IN" sz="2400" dirty="0"/>
-              <a:t>l</a:t>
-            </a:r>
-            <a:r>
-              <a:rPr lang="en-IN" sz="2400" dirty="0" smtClean="0"/>
-              <a:t>ower bound</a:t>
-            </a:r>
-            <a:br>
-              <a:rPr lang="en-IN" sz="2400" dirty="0" smtClean="0"/>
-            </a:br>
-            <a:r>
-              <a:rPr lang="en-IN" sz="2400" dirty="0" smtClean="0"/>
-              <a:t>Relaxed Word Mover’s Distance is a tighter bound</a:t>
-            </a:r>
-            <a:endParaRPr lang="en-IN" sz="2400" dirty="0"/>
+            <a:pPr lvl="0" rtl="0">
+              <a:spcBef>
+                <a:spcPts val="0"/>
+              </a:spcBef>
+              <a:buNone/>
+            </a:pPr>
+            <a:r>
+              <a:rPr lang="en"/>
+              <a:t>Word Mover’s distance </a:t>
+            </a:r>
           </a:p>
         </p:txBody>
       </p:sp>
       <p:pic>
         <p:nvPicPr>
-          <p:cNvPr id="4" name="Picture 3"/>
-          <p:cNvPicPr>
-            <a:picLocks noChangeAspect="1"/>
-          </p:cNvPicPr>
+          <p:cNvPr id="108" name="Shape 108"/>
+          <p:cNvPicPr preferRelativeResize="0"/>
           <p:nvPr/>
         </p:nvPicPr>
         <p:blipFill>
-          <a:blip r:embed="rId3"/>
+          <a:blip r:embed="rId3">
+            <a:alphaModFix/>
+          </a:blip>
           <a:stretch>
             <a:fillRect/>
           </a:stretch>
         </p:blipFill>
         <p:spPr>
           <a:xfrm>
-            <a:off x="5312715" y="2478826"/>
-            <a:ext cx="1669976" cy="1463782"/>
-          </a:xfrm>
-          <a:prstGeom prst="rect">
-            <a:avLst/>
-          </a:prstGeom>
+            <a:off x="888851" y="783199"/>
+            <a:ext cx="6742900" cy="4017250"/>
+          </a:xfrm>
+          <a:prstGeom prst="rect">
+            <a:avLst/>
+          </a:prstGeom>
+          <a:noFill/>
+          <a:ln>
+            <a:noFill/>
+          </a:ln>
         </p:spPr>
       </p:pic>
-      <p:pic>
-        <p:nvPicPr>
-          <p:cNvPr id="5" name="Picture 4"/>
-          <p:cNvPicPr>
-            <a:picLocks noChangeAspect="1"/>
-          </p:cNvPicPr>
+      <p:sp>
+        <p:nvSpPr>
+          <p:cNvPr id="109" name="Shape 109"/>
+          <p:cNvSpPr txBox="1"/>
           <p:nvPr/>
-        </p:nvPicPr>
-        <p:blipFill>
-          <a:blip r:embed="rId4"/>
-          <a:stretch>
-            <a:fillRect/>
-          </a:stretch>
-        </p:blipFill>
-        <p:spPr>
-          <a:xfrm>
-            <a:off x="641729" y="1948613"/>
-            <a:ext cx="3404807" cy="2599636"/>
-          </a:xfrm>
-          <a:prstGeom prst="rect">
-            <a:avLst/>
-          </a:prstGeom>
-        </p:spPr>
-      </p:pic>
-      <p:sp>
-        <p:nvSpPr>
-          <p:cNvPr id="7" name="Rectangle 6"/>
-          <p:cNvSpPr/>
-          <p:nvPr/>
-        </p:nvSpPr>
-        <p:spPr>
-          <a:xfrm>
-            <a:off x="4417625" y="4543547"/>
-            <a:ext cx="4370107" cy="307777"/>
-          </a:xfrm>
-          <a:prstGeom prst="rect">
-            <a:avLst/>
-          </a:prstGeom>
+        </p:nvSpPr>
+        <p:spPr>
+          <a:xfrm>
+            <a:off x="176050" y="3973950"/>
+            <a:ext cx="8802900" cy="1169400"/>
+          </a:xfrm>
+          <a:prstGeom prst="rect">
+            <a:avLst/>
+          </a:prstGeom>
+          <a:solidFill>
+            <a:schemeClr val="lt1"/>
+          </a:solidFill>
+          <a:ln>
+            <a:noFill/>
+          </a:ln>
         </p:spPr>
         <p:txBody>
-          <a:bodyPr wrap="none">
-            <a:spAutoFit/>
+          <a:bodyPr lIns="91425" tIns="91425" rIns="91425" bIns="91425" anchor="ctr" anchorCtr="0">
+            <a:noAutofit/>
           </a:bodyPr>
           <a:lstStyle/>
           <a:p>
-            <a:pPr lvl="0"/>
+            <a:pPr lvl="0" rtl="0">
+              <a:spcBef>
+                <a:spcPts val="0"/>
+              </a:spcBef>
+              <a:buNone/>
+            </a:pPr>
+            <a:r>
+              <a:rPr lang="en" u="sng" dirty="0">
+                <a:solidFill>
+                  <a:schemeClr val="hlink"/>
+                </a:solidFill>
+                <a:hlinkClick r:id="rId4"/>
+              </a:rPr>
+              <a:t>http://jmlr.org/proceedings/papers/v37/kusnerb15.pdf</a:t>
+            </a:r>
+          </a:p>
+          <a:p>
+            <a:pPr lvl="0" rtl="0">
+              <a:spcBef>
+                <a:spcPts val="0"/>
+              </a:spcBef>
+              <a:buNone/>
+            </a:pPr>
             <a:r>
               <a:rPr lang="en" u="sng" dirty="0">
                 <a:solidFill>
@@ -8285,17 +8769,21 @@
                 </a:solidFill>
                 <a:hlinkClick r:id="rId5"/>
               </a:rPr>
-              <a:t>http://jmlr.org/proceedings/papers/v37/kusnerb15.pdf</a:t>
-            </a:r>
+              <a:t>https://github.com/mkusner/wmd</a:t>
+            </a:r>
+          </a:p>
+          <a:p>
+            <a:pPr lvl="0" rtl="0">
+              <a:spcBef>
+                <a:spcPts val="0"/>
+              </a:spcBef>
+              <a:buNone/>
+            </a:pPr>
+            <a:endParaRPr dirty="0"/>
           </a:p>
         </p:txBody>
       </p:sp>
     </p:spTree>
-    <p:extLst>
-      <p:ext uri="{BB962C8B-B14F-4D97-AF65-F5344CB8AC3E}">
-        <p14:creationId xmlns:p14="http://schemas.microsoft.com/office/powerpoint/2010/main" val="1798281980"/>
-      </p:ext>
-    </p:extLst>
   </p:cSld>
   <p:clrMapOvr>
     <a:masterClrMapping/>
@@ -8315,7 +8803,7 @@
   <p:cSld>
     <p:spTree>
       <p:nvGrpSpPr>
-        <p:cNvPr id="1" name="Shape 126"/>
+        <p:cNvPr id="1" name="Shape 113"/>
         <p:cNvGrpSpPr/>
         <p:nvPr/>
       </p:nvGrpSpPr>
@@ -8329,7 +8817,7 @@
       </p:grpSpPr>
       <p:sp>
         <p:nvSpPr>
-          <p:cNvPr id="127" name="Shape 127"/>
+          <p:cNvPr id="114" name="Shape 114"/>
           <p:cNvSpPr txBox="1">
             <a:spLocks noGrp="1"/>
           </p:cNvSpPr>
@@ -8339,7 +8827,7 @@
         </p:nvSpPr>
         <p:spPr>
           <a:xfrm>
-            <a:off x="311708" y="-301800"/>
+            <a:off x="8" y="-1055625"/>
             <a:ext cx="8520600" cy="2052600"/>
           </a:xfrm>
           <a:prstGeom prst="rect">
@@ -8352,7 +8840,7 @@
           </a:bodyPr>
           <a:lstStyle/>
           <a:p>
-            <a:pPr lvl="0" rtl="0">
+            <a:pPr lvl="0">
               <a:spcBef>
                 <a:spcPts val="0"/>
               </a:spcBef>
@@ -8360,118 +8848,14 @@
             </a:pPr>
             <a:r>
               <a:rPr lang="en"/>
-              <a:t>Finding similar reviews</a:t>
-            </a:r>
-          </a:p>
-          <a:p>
-            <a:pPr lvl="0">
-              <a:spcBef>
-                <a:spcPts val="0"/>
-              </a:spcBef>
-              <a:buNone/>
-            </a:pPr>
-            <a:endParaRPr/>
-          </a:p>
-        </p:txBody>
-      </p:sp>
-      <p:sp>
-        <p:nvSpPr>
-          <p:cNvPr id="128" name="Shape 128"/>
-          <p:cNvSpPr txBox="1">
-            <a:spLocks noGrp="1"/>
-          </p:cNvSpPr>
-          <p:nvPr>
-            <p:ph type="subTitle" idx="1"/>
-          </p:nvPr>
-        </p:nvSpPr>
-        <p:spPr>
-          <a:xfrm>
-            <a:off x="311700" y="1092350"/>
-            <a:ext cx="8520600" cy="792600"/>
-          </a:xfrm>
-          <a:prstGeom prst="rect">
-            <a:avLst/>
-          </a:prstGeom>
-        </p:spPr>
-        <p:txBody>
-          <a:bodyPr lIns="91425" tIns="91425" rIns="91425" bIns="91425" anchor="t" anchorCtr="0">
-            <a:noAutofit/>
-          </a:bodyPr>
-          <a:lstStyle/>
-          <a:p>
-            <a:pPr lvl="0" algn="l" rtl="0">
-              <a:spcBef>
-                <a:spcPts val="0"/>
-              </a:spcBef>
-              <a:buClr>
-                <a:schemeClr val="dk1"/>
-              </a:buClr>
-              <a:buSzPct val="55000"/>
-              <a:buFont typeface="Arial"/>
-              <a:buNone/>
-            </a:pPr>
-            <a:r>
-              <a:rPr lang="en" sz="2000"/>
-              <a:t>from gensim.similarities import WmdSimilarity</a:t>
-            </a:r>
-          </a:p>
-          <a:p>
-            <a:pPr lvl="0" algn="l" rtl="0">
-              <a:spcBef>
-                <a:spcPts val="0"/>
-              </a:spcBef>
-              <a:buClr>
-                <a:schemeClr val="dk1"/>
-              </a:buClr>
-              <a:buSzPct val="55000"/>
-              <a:buFont typeface="Arial"/>
-              <a:buNone/>
-            </a:pPr>
-            <a:endParaRPr sz="2000"/>
-          </a:p>
-          <a:p>
-            <a:pPr lvl="0" algn="l" rtl="0">
-              <a:spcBef>
-                <a:spcPts val="0"/>
-              </a:spcBef>
-              <a:buClr>
-                <a:schemeClr val="dk1"/>
-              </a:buClr>
-              <a:buSzPct val="55000"/>
-              <a:buFont typeface="Arial"/>
-              <a:buNone/>
-            </a:pPr>
-            <a:r>
-              <a:rPr lang="en" sz="2000"/>
-              <a:t>similiar_reviews = WmdSimilarity(reviews, model, num_best=10)</a:t>
-            </a:r>
-          </a:p>
-          <a:p>
-            <a:pPr lvl="0" algn="l" rtl="0">
-              <a:spcBef>
-                <a:spcPts val="0"/>
-              </a:spcBef>
-              <a:buNone/>
-            </a:pPr>
-            <a:r>
-              <a:rPr lang="en" sz="2000"/>
-              <a:t>similar_reviews['Very good, you should seat outdoor.']</a:t>
-            </a:r>
-          </a:p>
-          <a:p>
-            <a:pPr lvl="0" algn="l">
-              <a:spcBef>
-                <a:spcPts val="0"/>
-              </a:spcBef>
-              <a:buNone/>
-            </a:pPr>
-            <a:endParaRPr sz="2000"/>
+              <a:t>Word Mover’s distance </a:t>
+            </a:r>
           </a:p>
         </p:txBody>
       </p:sp>
       <p:pic>
         <p:nvPicPr>
-          <p:cNvPr id="129" name="Shape 129"/>
+          <p:cNvPr id="115" name="Shape 115"/>
           <p:cNvPicPr preferRelativeResize="0"/>
           <p:nvPr/>
         </p:nvPicPr>
@@ -8485,8 +8869,8 @@
         </p:blipFill>
         <p:spPr>
           <a:xfrm>
-            <a:off x="142137" y="954025"/>
-            <a:ext cx="8859725" cy="1737200"/>
+            <a:off x="3893903" y="1263721"/>
+            <a:ext cx="4821911" cy="3099178"/>
           </a:xfrm>
           <a:prstGeom prst="rect">
             <a:avLst/>
@@ -8497,71 +8881,103 @@
           </a:ln>
         </p:spPr>
       </p:pic>
+      <p:sp>
+        <p:nvSpPr>
+          <p:cNvPr id="116" name="Shape 116"/>
+          <p:cNvSpPr txBox="1"/>
+          <p:nvPr/>
+        </p:nvSpPr>
+        <p:spPr>
+          <a:xfrm>
+            <a:off x="156570" y="3814014"/>
+            <a:ext cx="8727600" cy="1760700"/>
+          </a:xfrm>
+          <a:prstGeom prst="rect">
+            <a:avLst/>
+          </a:prstGeom>
+          <a:noFill/>
+          <a:ln>
+            <a:noFill/>
+          </a:ln>
+        </p:spPr>
+        <p:txBody>
+          <a:bodyPr lIns="91425" tIns="91425" rIns="91425" bIns="91425" anchor="ctr" anchorCtr="0">
+            <a:noAutofit/>
+          </a:bodyPr>
+          <a:lstStyle/>
+          <a:p>
+            <a:pPr lvl="0" rtl="0">
+              <a:lnSpc>
+                <a:spcPct val="115000"/>
+              </a:lnSpc>
+              <a:spcBef>
+                <a:spcPts val="0"/>
+              </a:spcBef>
+              <a:buNone/>
+            </a:pPr>
+            <a:r>
+              <a:rPr lang="en" u="sng" dirty="0">
+                <a:solidFill>
+                  <a:schemeClr val="hlink"/>
+                </a:solidFill>
+                <a:hlinkClick r:id="rId4"/>
+              </a:rPr>
+              <a:t>http://tech.opentable.com/2015/08/11/navigating-themes-in-restaurant-reviews-with-word-movers-distance/</a:t>
+            </a:r>
+          </a:p>
+        </p:txBody>
+      </p:sp>
       <p:pic>
         <p:nvPicPr>
-          <p:cNvPr id="130" name="Shape 130"/>
-          <p:cNvPicPr preferRelativeResize="0"/>
+          <p:cNvPr id="2" name="Picture 1"/>
+          <p:cNvPicPr>
+            <a:picLocks noChangeAspect="1"/>
+          </p:cNvPicPr>
           <p:nvPr/>
         </p:nvPicPr>
         <p:blipFill>
-          <a:blip r:embed="rId4">
-            <a:alphaModFix/>
-          </a:blip>
+          <a:blip r:embed="rId5"/>
           <a:stretch>
             <a:fillRect/>
           </a:stretch>
         </p:blipFill>
         <p:spPr>
           <a:xfrm>
-            <a:off x="368100" y="2850525"/>
-            <a:ext cx="7362875" cy="1934200"/>
+            <a:off x="156570" y="1518854"/>
+            <a:ext cx="3273207" cy="1773281"/>
+          </a:xfrm>
+          <a:prstGeom prst="rect">
+            <a:avLst/>
+          </a:prstGeom>
+        </p:spPr>
+      </p:pic>
+      <p:sp>
+        <p:nvSpPr>
+          <p:cNvPr id="3" name="TextBox 2"/>
+          <p:cNvSpPr txBox="1"/>
+          <p:nvPr/>
+        </p:nvSpPr>
+        <p:spPr>
+          <a:xfrm>
+            <a:off x="581889" y="3521268"/>
+            <a:ext cx="2945081" cy="369332"/>
           </a:xfrm>
           <a:prstGeom prst="rect">
             <a:avLst/>
           </a:prstGeom>
           <a:noFill/>
-          <a:ln>
-            <a:noFill/>
-          </a:ln>
-        </p:spPr>
-      </p:pic>
-      <p:sp>
-        <p:nvSpPr>
-          <p:cNvPr id="2" name="Rectangle 1"/>
-          <p:cNvSpPr/>
-          <p:nvPr/>
-        </p:nvSpPr>
-        <p:spPr>
-          <a:xfrm>
-            <a:off x="4197927" y="4620280"/>
-            <a:ext cx="5611230" cy="523220"/>
-          </a:xfrm>
-          <a:prstGeom prst="rect">
-            <a:avLst/>
-          </a:prstGeom>
         </p:spPr>
         <p:txBody>
-          <a:bodyPr wrap="square">
+          <a:bodyPr wrap="square" rtlCol="0">
             <a:spAutoFit/>
           </a:bodyPr>
           <a:lstStyle/>
           <a:p>
             <a:r>
-              <a:rPr lang="en-IN" dirty="0"/>
-              <a:t>Credits : Lev </a:t>
-            </a:r>
-            <a:r>
-              <a:rPr lang="en-IN" dirty="0" err="1"/>
-              <a:t>Konstantinovskiy</a:t>
-            </a:r>
-            <a:endParaRPr lang="en-IN" dirty="0"/>
-          </a:p>
-          <a:p>
-            <a:r>
-              <a:rPr lang="en-IN" dirty="0"/>
-              <a:t>https://speakerdeck.com/tmylk/same-content-different-words</a:t>
-            </a:r>
-            <a:endParaRPr lang="en-IN" dirty="0"/>
+              <a:rPr lang="en-IN" sz="1800" dirty="0" smtClean="0"/>
+              <a:t>Optimization Expression</a:t>
+            </a:r>
+            <a:endParaRPr lang="en-IN" sz="1800" dirty="0"/>
           </a:p>
         </p:txBody>
       </p:sp>

</xml_diff>